<commit_message>
UserStories v2 e Testes de aceitação (04,07,08)
</commit_message>
<xml_diff>
--- a/GestaoFinancaPessoal/GestaoFinancaPessoal/Documentos/Entrega-02/UserStories.pptx
+++ b/GestaoFinancaPessoal/GestaoFinancaPessoal/Documentos/Entrega-02/UserStories.pptx
@@ -200,7 +200,7 @@
           <a:p>
             <a:fld id="{59A9F43D-7447-447E-A29C-D6932C4AEFE9}" type="datetimeFigureOut">
               <a:rPr lang="pt-BR" smtClean="0"/>
-              <a:t>03/05/2019</a:t>
+              <a:t>04/05/2019</a:t>
             </a:fld>
             <a:endParaRPr lang="pt-BR"/>
           </a:p>
@@ -2334,7 +2334,7 @@
           <a:p>
             <a:fld id="{41691924-F185-4213-BC46-97937F4C6F71}" type="datetimeFigureOut">
               <a:rPr lang="pt-BR" smtClean="0"/>
-              <a:t>03/05/2019</a:t>
+              <a:t>04/05/2019</a:t>
             </a:fld>
             <a:endParaRPr lang="pt-BR"/>
           </a:p>
@@ -2532,7 +2532,7 @@
           <a:p>
             <a:fld id="{41691924-F185-4213-BC46-97937F4C6F71}" type="datetimeFigureOut">
               <a:rPr lang="pt-BR" smtClean="0"/>
-              <a:t>03/05/2019</a:t>
+              <a:t>04/05/2019</a:t>
             </a:fld>
             <a:endParaRPr lang="pt-BR"/>
           </a:p>
@@ -2740,7 +2740,7 @@
           <a:p>
             <a:fld id="{41691924-F185-4213-BC46-97937F4C6F71}" type="datetimeFigureOut">
               <a:rPr lang="pt-BR" smtClean="0"/>
-              <a:t>03/05/2019</a:t>
+              <a:t>04/05/2019</a:t>
             </a:fld>
             <a:endParaRPr lang="pt-BR"/>
           </a:p>
@@ -2938,7 +2938,7 @@
           <a:p>
             <a:fld id="{41691924-F185-4213-BC46-97937F4C6F71}" type="datetimeFigureOut">
               <a:rPr lang="pt-BR" smtClean="0"/>
-              <a:t>03/05/2019</a:t>
+              <a:t>04/05/2019</a:t>
             </a:fld>
             <a:endParaRPr lang="pt-BR"/>
           </a:p>
@@ -3213,7 +3213,7 @@
           <a:p>
             <a:fld id="{41691924-F185-4213-BC46-97937F4C6F71}" type="datetimeFigureOut">
               <a:rPr lang="pt-BR" smtClean="0"/>
-              <a:t>03/05/2019</a:t>
+              <a:t>04/05/2019</a:t>
             </a:fld>
             <a:endParaRPr lang="pt-BR"/>
           </a:p>
@@ -3478,7 +3478,7 @@
           <a:p>
             <a:fld id="{41691924-F185-4213-BC46-97937F4C6F71}" type="datetimeFigureOut">
               <a:rPr lang="pt-BR" smtClean="0"/>
-              <a:t>03/05/2019</a:t>
+              <a:t>04/05/2019</a:t>
             </a:fld>
             <a:endParaRPr lang="pt-BR"/>
           </a:p>
@@ -3890,7 +3890,7 @@
           <a:p>
             <a:fld id="{41691924-F185-4213-BC46-97937F4C6F71}" type="datetimeFigureOut">
               <a:rPr lang="pt-BR" smtClean="0"/>
-              <a:t>03/05/2019</a:t>
+              <a:t>04/05/2019</a:t>
             </a:fld>
             <a:endParaRPr lang="pt-BR"/>
           </a:p>
@@ -4031,7 +4031,7 @@
           <a:p>
             <a:fld id="{41691924-F185-4213-BC46-97937F4C6F71}" type="datetimeFigureOut">
               <a:rPr lang="pt-BR" smtClean="0"/>
-              <a:t>03/05/2019</a:t>
+              <a:t>04/05/2019</a:t>
             </a:fld>
             <a:endParaRPr lang="pt-BR"/>
           </a:p>
@@ -4144,7 +4144,7 @@
           <a:p>
             <a:fld id="{41691924-F185-4213-BC46-97937F4C6F71}" type="datetimeFigureOut">
               <a:rPr lang="pt-BR" smtClean="0"/>
-              <a:t>03/05/2019</a:t>
+              <a:t>04/05/2019</a:t>
             </a:fld>
             <a:endParaRPr lang="pt-BR"/>
           </a:p>
@@ -4455,7 +4455,7 @@
           <a:p>
             <a:fld id="{41691924-F185-4213-BC46-97937F4C6F71}" type="datetimeFigureOut">
               <a:rPr lang="pt-BR" smtClean="0"/>
-              <a:t>03/05/2019</a:t>
+              <a:t>04/05/2019</a:t>
             </a:fld>
             <a:endParaRPr lang="pt-BR"/>
           </a:p>
@@ -4743,7 +4743,7 @@
           <a:p>
             <a:fld id="{41691924-F185-4213-BC46-97937F4C6F71}" type="datetimeFigureOut">
               <a:rPr lang="pt-BR" smtClean="0"/>
-              <a:t>03/05/2019</a:t>
+              <a:t>04/05/2019</a:t>
             </a:fld>
             <a:endParaRPr lang="pt-BR"/>
           </a:p>
@@ -4984,7 +4984,7 @@
           <a:p>
             <a:fld id="{41691924-F185-4213-BC46-97937F4C6F71}" type="datetimeFigureOut">
               <a:rPr lang="pt-BR" smtClean="0"/>
-              <a:t>03/05/2019</a:t>
+              <a:t>04/05/2019</a:t>
             </a:fld>
             <a:endParaRPr lang="pt-BR"/>
           </a:p>
@@ -5416,14 +5416,14 @@
           <p:nvPr>
             <p:extLst>
               <p:ext uri="{D42A27DB-BD31-4B8C-83A1-F6EECF244321}">
-                <p14:modId xmlns:p14="http://schemas.microsoft.com/office/powerpoint/2010/main" val="923879999"/>
+                <p14:modId xmlns:p14="http://schemas.microsoft.com/office/powerpoint/2010/main" val="1548597955"/>
               </p:ext>
             </p:extLst>
           </p:nvPr>
         </p:nvGraphicFramePr>
         <p:xfrm>
-          <a:off x="158482" y="200024"/>
-          <a:ext cx="11778145" cy="6457951"/>
+          <a:off x="158482" y="200026"/>
+          <a:ext cx="11778145" cy="6584541"/>
         </p:xfrm>
         <a:graphic>
           <a:graphicData uri="http://schemas.openxmlformats.org/drawingml/2006/table">
@@ -5440,7 +5440,7 @@
                   </a:extLst>
                 </a:gridCol>
               </a:tblGrid>
-              <a:tr h="362931">
+              <a:tr h="212617">
                 <a:tc>
                   <a:txBody>
                     <a:bodyPr/>
@@ -5752,25 +5752,25 @@
                         </a:tabLst>
                       </a:pPr>
                       <a:r>
-                        <a:rPr kumimoji="0" lang="pt-BR" altLang="pt-BR" sz="800" u="none" strike="noStrike" cap="none" normalizeH="0" baseline="0" dirty="0">
+                        <a:rPr kumimoji="0" lang="pt-BR" altLang="pt-BR" sz="1000" b="0" u="none" strike="noStrike" cap="none" normalizeH="0" baseline="0" dirty="0">
                           <a:ln>
                             <a:noFill/>
                           </a:ln>
+                          <a:solidFill>
+                            <a:schemeClr val="tx1"/>
+                          </a:solidFill>
                           <a:effectLst/>
                           <a:latin typeface="Arial" panose="020B0604020202020204" pitchFamily="34" charset="0"/>
                           <a:cs typeface="Arial" panose="020B0604020202020204" pitchFamily="34" charset="0"/>
                         </a:rPr>
                         <a:t>US04 – REGISTRAR RECORRENTES</a:t>
                       </a:r>
-                      <a:endParaRPr kumimoji="0" lang="pt-BR" altLang="pt-BR" sz="800" b="0" i="0" u="none" strike="noStrike" cap="none" normalizeH="0" baseline="0" dirty="0">
+                      <a:endParaRPr kumimoji="0" lang="pt-BR" altLang="pt-BR" sz="1000" b="0" i="0" u="none" strike="noStrike" cap="none" normalizeH="0" baseline="0" dirty="0">
                         <a:ln>
                           <a:noFill/>
                         </a:ln>
                         <a:solidFill>
-                          <a:schemeClr val="tx1">
-                            <a:lumMod val="95000"/>
-                            <a:lumOff val="5000"/>
-                          </a:schemeClr>
+                          <a:schemeClr val="tx1"/>
                         </a:solidFill>
                         <a:effectLst/>
                         <a:latin typeface="Arial" panose="020B0604020202020204" pitchFamily="34" charset="0"/>
@@ -5786,7 +5786,7 @@
                   </a:ext>
                 </a:extLst>
               </a:tr>
-              <a:tr h="842061">
+              <a:tr h="399258">
                 <a:tc>
                   <a:txBody>
                     <a:bodyPr/>
@@ -6098,10 +6098,13 @@
                         </a:tabLst>
                       </a:pPr>
                       <a:r>
-                        <a:rPr kumimoji="0" lang="pt-BR" altLang="pt-BR" sz="800" u="none" strike="noStrike" cap="none" normalizeH="0" baseline="0" dirty="0">
+                        <a:rPr kumimoji="0" lang="pt-BR" altLang="pt-BR" sz="1000" b="0" u="none" strike="noStrike" cap="none" normalizeH="0" baseline="0" dirty="0">
                           <a:ln>
                             <a:noFill/>
                           </a:ln>
+                          <a:solidFill>
+                            <a:schemeClr val="tx1"/>
+                          </a:solidFill>
                           <a:effectLst/>
                           <a:latin typeface="Arial" panose="020B0604020202020204" pitchFamily="34" charset="0"/>
                           <a:cs typeface="Arial" panose="020B0604020202020204" pitchFamily="34" charset="0"/>
@@ -6140,25 +6143,25 @@
                         </a:tabLst>
                       </a:pPr>
                       <a:r>
-                        <a:rPr kumimoji="0" lang="pt-BR" altLang="pt-BR" sz="800" u="none" strike="noStrike" cap="none" normalizeH="0" baseline="0" dirty="0">
+                        <a:rPr kumimoji="0" lang="pt-BR" altLang="pt-BR" sz="1000" b="0" u="none" strike="noStrike" cap="none" normalizeH="0" baseline="0" dirty="0">
                           <a:ln>
                             <a:noFill/>
                           </a:ln>
+                          <a:solidFill>
+                            <a:schemeClr val="tx1"/>
+                          </a:solidFill>
                           <a:effectLst/>
                           <a:latin typeface="Arial" panose="020B0604020202020204" pitchFamily="34" charset="0"/>
                           <a:cs typeface="Arial" panose="020B0604020202020204" pitchFamily="34" charset="0"/>
                         </a:rPr>
                         <a:t>**Recorrente quer dizer que um lançamento se repete cada tanto tempo. </a:t>
                       </a:r>
-                      <a:endParaRPr kumimoji="0" lang="pt-BR" altLang="pt-BR" sz="800" b="0" i="1" u="none" strike="noStrike" cap="none" normalizeH="0" baseline="0" dirty="0">
+                      <a:endParaRPr kumimoji="0" lang="pt-BR" altLang="pt-BR" sz="1000" b="0" i="1" u="none" strike="noStrike" cap="none" normalizeH="0" baseline="0" dirty="0">
                         <a:ln>
                           <a:noFill/>
                         </a:ln>
                         <a:solidFill>
-                          <a:schemeClr val="tx1">
-                            <a:lumMod val="95000"/>
-                            <a:lumOff val="5000"/>
-                          </a:schemeClr>
+                          <a:schemeClr val="tx1"/>
                         </a:solidFill>
                         <a:effectLst/>
                         <a:latin typeface="Arial" panose="020B0604020202020204" pitchFamily="34" charset="0"/>
@@ -6174,7 +6177,7 @@
                   </a:ext>
                 </a:extLst>
               </a:tr>
-              <a:tr h="883294">
+              <a:tr h="531367">
                 <a:tc>
                   <a:txBody>
                     <a:bodyPr/>
@@ -6486,10 +6489,13 @@
                         </a:tabLst>
                       </a:pPr>
                       <a:r>
-                        <a:rPr kumimoji="0" lang="pt-BR" altLang="pt-BR" sz="800" u="none" strike="noStrike" cap="none" normalizeH="0" baseline="0" dirty="0">
+                        <a:rPr kumimoji="0" lang="pt-BR" altLang="pt-BR" sz="1000" b="0" u="none" strike="noStrike" cap="none" normalizeH="0" baseline="0" dirty="0">
                           <a:ln>
                             <a:noFill/>
                           </a:ln>
+                          <a:solidFill>
+                            <a:schemeClr val="tx1"/>
+                          </a:solidFill>
                           <a:effectLst/>
                           <a:latin typeface="Arial" panose="020B0604020202020204" pitchFamily="34" charset="0"/>
                           <a:cs typeface="Arial" panose="020B0604020202020204" pitchFamily="34" charset="0"/>
@@ -6530,10 +6536,13 @@
                         </a:tabLst>
                       </a:pPr>
                       <a:r>
-                        <a:rPr kumimoji="0" lang="pt-BR" altLang="pt-BR" sz="800" u="none" strike="noStrike" cap="none" normalizeH="0" baseline="0" dirty="0">
+                        <a:rPr kumimoji="0" lang="pt-BR" altLang="pt-BR" sz="1000" b="0" u="none" strike="noStrike" cap="none" normalizeH="0" baseline="0" dirty="0">
                           <a:ln>
                             <a:noFill/>
                           </a:ln>
+                          <a:solidFill>
+                            <a:schemeClr val="tx1"/>
+                          </a:solidFill>
                           <a:effectLst/>
                           <a:latin typeface="Arial" panose="020B0604020202020204" pitchFamily="34" charset="0"/>
                           <a:cs typeface="Arial" panose="020B0604020202020204" pitchFamily="34" charset="0"/>
@@ -6574,25 +6583,25 @@
                         </a:tabLst>
                       </a:pPr>
                       <a:r>
-                        <a:rPr kumimoji="0" lang="pt-BR" altLang="pt-BR" sz="800" u="none" strike="noStrike" cap="none" normalizeH="0" baseline="0" dirty="0">
+                        <a:rPr kumimoji="0" lang="pt-BR" altLang="pt-BR" sz="1000" b="0" u="none" strike="noStrike" cap="none" normalizeH="0" baseline="0" dirty="0">
                           <a:ln>
                             <a:noFill/>
                           </a:ln>
+                          <a:solidFill>
+                            <a:schemeClr val="tx1"/>
+                          </a:solidFill>
                           <a:effectLst/>
                           <a:latin typeface="Arial" panose="020B0604020202020204" pitchFamily="34" charset="0"/>
                           <a:cs typeface="Arial" panose="020B0604020202020204" pitchFamily="34" charset="0"/>
                         </a:rPr>
                         <a:t> Atualizar lançamento recorrente</a:t>
                       </a:r>
-                      <a:endParaRPr kumimoji="0" lang="pt-BR" altLang="pt-BR" sz="800" b="1" i="0" u="none" strike="noStrike" cap="none" normalizeH="0" baseline="0" dirty="0">
+                      <a:endParaRPr kumimoji="0" lang="pt-BR" altLang="pt-BR" sz="1000" b="0" i="0" u="none" strike="noStrike" cap="none" normalizeH="0" baseline="0" dirty="0">
                         <a:ln>
                           <a:noFill/>
                         </a:ln>
                         <a:solidFill>
-                          <a:schemeClr val="tx1">
-                            <a:lumMod val="95000"/>
-                            <a:lumOff val="5000"/>
-                          </a:schemeClr>
+                          <a:schemeClr val="tx1"/>
                         </a:solidFill>
                         <a:effectLst/>
                         <a:latin typeface="Arial" panose="020B0604020202020204" pitchFamily="34" charset="0"/>
@@ -6608,7 +6617,7 @@
                   </a:ext>
                 </a:extLst>
               </a:tr>
-              <a:tr h="1739213">
+              <a:tr h="1492009">
                 <a:tc>
                   <a:txBody>
                     <a:bodyPr/>
@@ -6920,10 +6929,13 @@
                         </a:tabLst>
                       </a:pPr>
                       <a:r>
-                        <a:rPr kumimoji="0" lang="pt-BR" altLang="pt-BR" sz="800" u="none" strike="noStrike" cap="none" normalizeH="0" baseline="0" dirty="0">
+                        <a:rPr kumimoji="0" lang="pt-BR" altLang="pt-BR" sz="1000" b="0" u="none" strike="noStrike" cap="none" normalizeH="0" baseline="0" dirty="0">
                           <a:ln>
                             <a:noFill/>
                           </a:ln>
+                          <a:solidFill>
+                            <a:schemeClr val="tx1"/>
+                          </a:solidFill>
                           <a:effectLst/>
                           <a:latin typeface="Arial" panose="020B0604020202020204" pitchFamily="34" charset="0"/>
                           <a:cs typeface="Arial" panose="020B0604020202020204" pitchFamily="34" charset="0"/>
@@ -6962,15 +6974,18 @@
                         </a:tabLst>
                       </a:pPr>
                       <a:r>
-                        <a:rPr kumimoji="0" lang="pt-BR" altLang="pt-BR" sz="800" u="none" strike="noStrike" cap="none" normalizeH="0" baseline="0" dirty="0">
+                        <a:rPr kumimoji="0" lang="pt-BR" altLang="pt-BR" sz="1000" b="0" u="none" strike="noStrike" cap="none" normalizeH="0" baseline="0" dirty="0">
                           <a:ln>
                             <a:noFill/>
                           </a:ln>
+                          <a:solidFill>
+                            <a:schemeClr val="tx1"/>
+                          </a:solidFill>
                           <a:effectLst/>
                           <a:latin typeface="Arial" panose="020B0604020202020204" pitchFamily="34" charset="0"/>
                           <a:cs typeface="Arial" panose="020B0604020202020204" pitchFamily="34" charset="0"/>
                         </a:rPr>
-                        <a:t>RN41. Cada lançamento recorrente pode ser do tipo “Parcelamento (mensal)” ou “Avançado”.</a:t>
+                        <a:t>RN4.1. Cada lançamento recorrente pode ser do tipo “Parcelamento (mensal)” ou “Avançado”.</a:t>
                       </a:r>
                     </a:p>
                     <a:p>
@@ -7004,15 +7019,18 @@
                         </a:tabLst>
                       </a:pPr>
                       <a:r>
-                        <a:rPr kumimoji="0" lang="pt-BR" altLang="pt-BR" sz="800" u="none" strike="noStrike" cap="none" normalizeH="0" baseline="0" dirty="0">
+                        <a:rPr kumimoji="0" lang="pt-BR" altLang="pt-BR" sz="1000" b="0" u="none" strike="noStrike" cap="none" normalizeH="0" baseline="0" dirty="0">
                           <a:ln>
                             <a:noFill/>
                           </a:ln>
+                          <a:solidFill>
+                            <a:schemeClr val="tx1"/>
+                          </a:solidFill>
                           <a:effectLst/>
                           <a:latin typeface="Arial" panose="020B0604020202020204" pitchFamily="34" charset="0"/>
                           <a:cs typeface="Arial" panose="020B0604020202020204" pitchFamily="34" charset="0"/>
                         </a:rPr>
-                        <a:t>RN42. Os campos obrigatórios do tipo parcelamento (mensal) são: inicio número de parcela e total de parcelas.</a:t>
+                        <a:t>RN4.2. Os campos obrigatórios do tipo parcelamento (mensal) são: inicio número de parcela e total de parcelas.</a:t>
                       </a:r>
                     </a:p>
                     <a:p>
@@ -7047,15 +7065,18 @@
                         <a:defRPr/>
                       </a:pPr>
                       <a:r>
-                        <a:rPr kumimoji="0" lang="pt-BR" altLang="pt-BR" sz="800" u="none" strike="noStrike" cap="none" normalizeH="0" baseline="0" dirty="0">
+                        <a:rPr kumimoji="0" lang="pt-BR" altLang="pt-BR" sz="1000" b="0" u="none" strike="noStrike" cap="none" normalizeH="0" baseline="0" dirty="0">
                           <a:ln>
                             <a:noFill/>
                           </a:ln>
+                          <a:solidFill>
+                            <a:schemeClr val="tx1"/>
+                          </a:solidFill>
                           <a:effectLst/>
                           <a:latin typeface="Arial" panose="020B0604020202020204" pitchFamily="34" charset="0"/>
                           <a:cs typeface="Arial" panose="020B0604020202020204" pitchFamily="34" charset="0"/>
                         </a:rPr>
-                        <a:t>RN43. Os campos obrigatório do tipo Avançado são: Repetir a cada (como mostra na imagem abaixo), iniciar na parcela número, Número de ocorrências, Valor Total.</a:t>
+                        <a:t>RN4.3. Os campos obrigatório do tipo Avançado são: Repetir a cada (como mostra na imagem abaixo), iniciar na parcela número, Número de ocorrências, Valor Total.</a:t>
                       </a:r>
                     </a:p>
                     <a:p>
@@ -7089,30 +7110,222 @@
                         </a:tabLst>
                       </a:pPr>
                       <a:r>
-                        <a:rPr kumimoji="0" lang="pt-BR" altLang="pt-BR" sz="800" u="none" strike="noStrike" cap="none" normalizeH="0" baseline="0" dirty="0">
+                        <a:rPr kumimoji="0" lang="pt-BR" altLang="pt-BR" sz="1000" b="0" u="none" strike="noStrike" cap="none" normalizeH="0" baseline="0" dirty="0">
                           <a:ln>
                             <a:noFill/>
                           </a:ln>
+                          <a:solidFill>
+                            <a:schemeClr val="tx1"/>
+                          </a:solidFill>
                           <a:effectLst/>
                           <a:latin typeface="Arial" panose="020B0604020202020204" pitchFamily="34" charset="0"/>
                           <a:cs typeface="Arial" panose="020B0604020202020204" pitchFamily="34" charset="0"/>
                         </a:rPr>
-                        <a:t>RN44. </a:t>
+                        <a:t>RN4.4. </a:t>
                       </a:r>
-                      <a:endParaRPr kumimoji="0" lang="pt-BR" altLang="pt-BR" sz="800" b="1" i="0" u="none" strike="noStrike" cap="none" normalizeH="0" baseline="0" dirty="0">
-                        <a:ln>
-                          <a:noFill/>
-                        </a:ln>
-                        <a:solidFill>
-                          <a:schemeClr val="tx1">
-                            <a:lumMod val="95000"/>
-                            <a:lumOff val="5000"/>
-                          </a:schemeClr>
-                        </a:solidFill>
-                        <a:effectLst/>
-                        <a:latin typeface="Arial" panose="020B0604020202020204" pitchFamily="34" charset="0"/>
-                        <a:cs typeface="Arial" panose="020B0604020202020204" pitchFamily="34" charset="0"/>
-                      </a:endParaRPr>
+                      <a:r>
+                        <a:rPr kumimoji="0" lang="pt-BR" altLang="pt-BR" sz="1000" b="0" i="0" u="none" strike="noStrike" cap="none" normalizeH="0" baseline="0" dirty="0">
+                          <a:ln>
+                            <a:noFill/>
+                          </a:ln>
+                          <a:solidFill>
+                            <a:schemeClr val="tx1"/>
+                          </a:solidFill>
+                          <a:effectLst/>
+                          <a:latin typeface="Arial" panose="020B0604020202020204" pitchFamily="34" charset="0"/>
+                          <a:ea typeface="MS PGothic" panose="020B0600070205080204" pitchFamily="34" charset="-128"/>
+                          <a:cs typeface="DejaVu Sans" charset="0"/>
+                        </a:rPr>
+                        <a:t>Todo lançamento recorrente de transferência deve ter uma conta origem e uma destino.</a:t>
+                      </a:r>
+                    </a:p>
+                    <a:p>
+                      <a:pPr marL="0" marR="0" lvl="0" indent="0" algn="l" defTabSz="449263" rtl="0" eaLnBrk="1" fontAlgn="base" latinLnBrk="0" hangingPunct="1">
+                        <a:lnSpc>
+                          <a:spcPct val="94000"/>
+                        </a:lnSpc>
+                        <a:spcBef>
+                          <a:spcPts val="350"/>
+                        </a:spcBef>
+                        <a:spcAft>
+                          <a:spcPct val="0"/>
+                        </a:spcAft>
+                        <a:buClrTx/>
+                        <a:buSzPct val="70000"/>
+                        <a:buFontTx/>
+                        <a:buNone/>
+                        <a:tabLst>
+                          <a:tab pos="0" algn="l"/>
+                          <a:tab pos="914400" algn="l"/>
+                          <a:tab pos="1828800" algn="l"/>
+                          <a:tab pos="2743200" algn="l"/>
+                          <a:tab pos="3657600" algn="l"/>
+                          <a:tab pos="4572000" algn="l"/>
+                          <a:tab pos="5486400" algn="l"/>
+                          <a:tab pos="6400800" algn="l"/>
+                          <a:tab pos="7315200" algn="l"/>
+                          <a:tab pos="8229600" algn="l"/>
+                          <a:tab pos="9144000" algn="l"/>
+                          <a:tab pos="10058400" algn="l"/>
+                        </a:tabLst>
+                        <a:defRPr/>
+                      </a:pPr>
+                      <a:r>
+                        <a:rPr kumimoji="0" lang="pt-BR" altLang="pt-BR" sz="1000" b="0" i="0" u="none" strike="noStrike" cap="none" normalizeH="0" baseline="0" dirty="0">
+                          <a:ln>
+                            <a:noFill/>
+                          </a:ln>
+                          <a:solidFill>
+                            <a:schemeClr val="tx1"/>
+                          </a:solidFill>
+                          <a:effectLst/>
+                          <a:latin typeface="Arial" panose="020B0604020202020204" pitchFamily="34" charset="0"/>
+                          <a:ea typeface="MS PGothic" panose="020B0600070205080204" pitchFamily="34" charset="-128"/>
+                          <a:cs typeface="DejaVu Sans" charset="0"/>
+                        </a:rPr>
+                        <a:t>RN4.5. Todo lançamento recorrente de despesa ou receita deve estar associada a uma conta financeira.</a:t>
+                      </a:r>
+                    </a:p>
+                    <a:p>
+                      <a:pPr marL="0" marR="0" lvl="0" indent="0" algn="l" defTabSz="449263" rtl="0" eaLnBrk="1" fontAlgn="base" latinLnBrk="0" hangingPunct="1">
+                        <a:lnSpc>
+                          <a:spcPct val="94000"/>
+                        </a:lnSpc>
+                        <a:spcBef>
+                          <a:spcPts val="350"/>
+                        </a:spcBef>
+                        <a:spcAft>
+                          <a:spcPct val="0"/>
+                        </a:spcAft>
+                        <a:buClrTx/>
+                        <a:buSzPct val="70000"/>
+                        <a:buFontTx/>
+                        <a:buNone/>
+                        <a:tabLst>
+                          <a:tab pos="0" algn="l"/>
+                          <a:tab pos="914400" algn="l"/>
+                          <a:tab pos="1828800" algn="l"/>
+                          <a:tab pos="2743200" algn="l"/>
+                          <a:tab pos="3657600" algn="l"/>
+                          <a:tab pos="4572000" algn="l"/>
+                          <a:tab pos="5486400" algn="l"/>
+                          <a:tab pos="6400800" algn="l"/>
+                          <a:tab pos="7315200" algn="l"/>
+                          <a:tab pos="8229600" algn="l"/>
+                          <a:tab pos="9144000" algn="l"/>
+                          <a:tab pos="10058400" algn="l"/>
+                        </a:tabLst>
+                        <a:defRPr/>
+                      </a:pPr>
+                      <a:r>
+                        <a:rPr kumimoji="0" lang="pt-BR" altLang="pt-BR" sz="1000" b="0" i="0" u="none" strike="noStrike" cap="none" normalizeH="0" baseline="0" dirty="0">
+                          <a:ln>
+                            <a:noFill/>
+                          </a:ln>
+                          <a:solidFill>
+                            <a:schemeClr val="tx1"/>
+                          </a:solidFill>
+                          <a:effectLst/>
+                          <a:latin typeface="Arial" panose="020B0604020202020204" pitchFamily="34" charset="0"/>
+                          <a:ea typeface="MS PGothic" panose="020B0600070205080204" pitchFamily="34" charset="-128"/>
+                          <a:cs typeface="DejaVu Sans" charset="0"/>
+                        </a:rPr>
+                        <a:t>RN4.8. Todo lançamento recorrente de receitas ou despesas deve ter uma categoria, valor.</a:t>
+                      </a:r>
+                    </a:p>
+                    <a:p>
+                      <a:pPr marL="0" marR="0" lvl="0" indent="0" algn="l" defTabSz="449263" rtl="0" eaLnBrk="1" fontAlgn="base" latinLnBrk="0" hangingPunct="1">
+                        <a:lnSpc>
+                          <a:spcPct val="94000"/>
+                        </a:lnSpc>
+                        <a:spcBef>
+                          <a:spcPts val="350"/>
+                        </a:spcBef>
+                        <a:spcAft>
+                          <a:spcPct val="0"/>
+                        </a:spcAft>
+                        <a:buClrTx/>
+                        <a:buSzPct val="70000"/>
+                        <a:buFontTx/>
+                        <a:buNone/>
+                        <a:tabLst>
+                          <a:tab pos="0" algn="l"/>
+                          <a:tab pos="914400" algn="l"/>
+                          <a:tab pos="1828800" algn="l"/>
+                          <a:tab pos="2743200" algn="l"/>
+                          <a:tab pos="3657600" algn="l"/>
+                          <a:tab pos="4572000" algn="l"/>
+                          <a:tab pos="5486400" algn="l"/>
+                          <a:tab pos="6400800" algn="l"/>
+                          <a:tab pos="7315200" algn="l"/>
+                          <a:tab pos="8229600" algn="l"/>
+                          <a:tab pos="9144000" algn="l"/>
+                          <a:tab pos="10058400" algn="l"/>
+                        </a:tabLst>
+                        <a:defRPr/>
+                      </a:pPr>
+                      <a:r>
+                        <a:rPr kumimoji="0" lang="pt-BR" altLang="pt-BR" sz="1000" b="0" i="0" u="none" strike="noStrike" cap="none" normalizeH="0" baseline="0" dirty="0">
+                          <a:ln>
+                            <a:noFill/>
+                          </a:ln>
+                          <a:solidFill>
+                            <a:schemeClr val="tx1"/>
+                          </a:solidFill>
+                          <a:effectLst/>
+                          <a:latin typeface="Arial" panose="020B0604020202020204" pitchFamily="34" charset="0"/>
+                          <a:ea typeface="MS PGothic" panose="020B0600070205080204" pitchFamily="34" charset="-128"/>
+                          <a:cs typeface="DejaVu Sans" charset="0"/>
+                        </a:rPr>
+                        <a:t>RN4.7. Todo lançamento recorrente de transferência não pode ser negativo.</a:t>
+                      </a:r>
+                    </a:p>
+                    <a:p>
+                      <a:pPr marL="0" marR="0" lvl="0" indent="0" algn="l" defTabSz="449263" rtl="0" eaLnBrk="1" fontAlgn="base" latinLnBrk="0" hangingPunct="1">
+                        <a:lnSpc>
+                          <a:spcPct val="94000"/>
+                        </a:lnSpc>
+                        <a:spcBef>
+                          <a:spcPts val="350"/>
+                        </a:spcBef>
+                        <a:spcAft>
+                          <a:spcPct val="0"/>
+                        </a:spcAft>
+                        <a:buClrTx/>
+                        <a:buSzPct val="70000"/>
+                        <a:buFontTx/>
+                        <a:buNone/>
+                        <a:tabLst>
+                          <a:tab pos="0" algn="l"/>
+                          <a:tab pos="914400" algn="l"/>
+                          <a:tab pos="1828800" algn="l"/>
+                          <a:tab pos="2743200" algn="l"/>
+                          <a:tab pos="3657600" algn="l"/>
+                          <a:tab pos="4572000" algn="l"/>
+                          <a:tab pos="5486400" algn="l"/>
+                          <a:tab pos="6400800" algn="l"/>
+                          <a:tab pos="7315200" algn="l"/>
+                          <a:tab pos="8229600" algn="l"/>
+                          <a:tab pos="9144000" algn="l"/>
+                          <a:tab pos="10058400" algn="l"/>
+                        </a:tabLst>
+                        <a:defRPr/>
+                      </a:pPr>
+                      <a:r>
+                        <a:rPr kumimoji="0" lang="pt-BR" altLang="pt-BR" sz="1000" b="0" i="0" u="none" strike="noStrike" cap="none" normalizeH="0" baseline="0" dirty="0">
+                          <a:ln>
+                            <a:noFill/>
+                          </a:ln>
+                          <a:solidFill>
+                            <a:schemeClr val="tx1"/>
+                          </a:solidFill>
+                          <a:effectLst/>
+                          <a:latin typeface="Arial" panose="020B0604020202020204" pitchFamily="34" charset="0"/>
+                          <a:ea typeface="MS PGothic" panose="020B0600070205080204" pitchFamily="34" charset="-128"/>
+                          <a:cs typeface="DejaVu Sans" charset="0"/>
+                        </a:rPr>
+                        <a:t>RN4.9. Todos campos podem ser alterados.</a:t>
+                      </a:r>
                     </a:p>
                   </a:txBody>
                   <a:tcPr marT="57817" marB="45722" horzOverflow="overflow"/>
@@ -7123,7 +7336,7 @@
                   </a:ext>
                 </a:extLst>
               </a:tr>
-              <a:tr h="1449585">
+              <a:tr h="2315038">
                 <a:tc>
                   <a:txBody>
                     <a:bodyPr/>
@@ -7435,10 +7648,13 @@
                         </a:tabLst>
                       </a:pPr>
                       <a:r>
-                        <a:rPr kumimoji="0" lang="pt-BR" altLang="pt-BR" sz="800" u="none" strike="noStrike" cap="none" normalizeH="0" baseline="0" dirty="0">
+                        <a:rPr kumimoji="0" lang="pt-BR" altLang="pt-BR" sz="1000" b="0" u="none" strike="noStrike" cap="none" normalizeH="0" baseline="0" dirty="0">
                           <a:ln>
                             <a:noFill/>
                           </a:ln>
+                          <a:solidFill>
+                            <a:schemeClr val="tx1"/>
+                          </a:solidFill>
                           <a:effectLst/>
                           <a:latin typeface="Arial" panose="020B0604020202020204" pitchFamily="34" charset="0"/>
                           <a:cs typeface="Arial" panose="020B0604020202020204" pitchFamily="34" charset="0"/>
@@ -7449,10 +7665,10 @@
                     <a:p>
                       <a:pPr marL="0" marR="0" lvl="0" indent="0" algn="l" defTabSz="449263" rtl="0" eaLnBrk="1" fontAlgn="base" latinLnBrk="0" hangingPunct="1">
                         <a:lnSpc>
-                          <a:spcPct val="94000"/>
+                          <a:spcPct val="76000"/>
                         </a:lnSpc>
                         <a:spcBef>
-                          <a:spcPts val="350"/>
+                          <a:spcPts val="400"/>
                         </a:spcBef>
                         <a:spcAft>
                           <a:spcPct val="0"/>
@@ -7475,16 +7691,344 @@
                           <a:tab pos="9144000" algn="l"/>
                           <a:tab pos="10058400" algn="l"/>
                         </a:tabLst>
-                        <a:defRPr/>
                       </a:pPr>
-                      <a:endParaRPr kumimoji="0" lang="pt-BR" altLang="pt-BR" sz="800" u="none" strike="noStrike" cap="none" normalizeH="0" baseline="0" dirty="0">
-                        <a:ln>
-                          <a:noFill/>
-                        </a:ln>
-                        <a:effectLst/>
-                        <a:latin typeface="Arial" panose="020B0604020202020204" pitchFamily="34" charset="0"/>
-                        <a:cs typeface="Arial" panose="020B0604020202020204" pitchFamily="34" charset="0"/>
-                      </a:endParaRPr>
+                      <a:r>
+                        <a:rPr kumimoji="0" lang="pt-BR" altLang="pt-BR" sz="1000" b="0" i="0" u="none" strike="noStrike" cap="none" normalizeH="0" baseline="0" dirty="0">
+                          <a:ln>
+                            <a:noFill/>
+                          </a:ln>
+                          <a:solidFill>
+                            <a:schemeClr val="tx1"/>
+                          </a:solidFill>
+                          <a:effectLst/>
+                          <a:latin typeface="Arial" panose="020B0604020202020204" pitchFamily="34" charset="0"/>
+                          <a:ea typeface="DejaVu Sans" charset="0"/>
+                          <a:cs typeface="Arial" panose="020B0604020202020204" pitchFamily="34" charset="0"/>
+                        </a:rPr>
+                        <a:t>TA4.1 – Tentar gerar um lançamento recorrente de despesa ou receita sem uma categoria ou subcategoria .</a:t>
+                      </a:r>
+                    </a:p>
+                    <a:p>
+                      <a:pPr marL="0" marR="0" lvl="0" indent="0" algn="l" defTabSz="449263" rtl="0" eaLnBrk="1" fontAlgn="base" latinLnBrk="0" hangingPunct="1">
+                        <a:lnSpc>
+                          <a:spcPct val="76000"/>
+                        </a:lnSpc>
+                        <a:spcBef>
+                          <a:spcPts val="400"/>
+                        </a:spcBef>
+                        <a:spcAft>
+                          <a:spcPct val="0"/>
+                        </a:spcAft>
+                        <a:buClrTx/>
+                        <a:buSzPct val="70000"/>
+                        <a:buFontTx/>
+                        <a:buNone/>
+                        <a:tabLst>
+                          <a:tab pos="0" algn="l"/>
+                          <a:tab pos="914400" algn="l"/>
+                          <a:tab pos="1828800" algn="l"/>
+                          <a:tab pos="2743200" algn="l"/>
+                          <a:tab pos="3657600" algn="l"/>
+                          <a:tab pos="4572000" algn="l"/>
+                          <a:tab pos="5486400" algn="l"/>
+                          <a:tab pos="6400800" algn="l"/>
+                          <a:tab pos="7315200" algn="l"/>
+                          <a:tab pos="8229600" algn="l"/>
+                          <a:tab pos="9144000" algn="l"/>
+                          <a:tab pos="10058400" algn="l"/>
+                        </a:tabLst>
+                      </a:pPr>
+                      <a:r>
+                        <a:rPr kumimoji="0" lang="pt-BR" altLang="pt-BR" sz="1000" b="0" i="0" u="none" strike="noStrike" cap="none" normalizeH="0" baseline="0" dirty="0">
+                          <a:ln>
+                            <a:noFill/>
+                          </a:ln>
+                          <a:solidFill>
+                            <a:schemeClr val="tx1"/>
+                          </a:solidFill>
+                          <a:effectLst/>
+                          <a:latin typeface="Arial" panose="020B0604020202020204" pitchFamily="34" charset="0"/>
+                          <a:ea typeface="DejaVu Sans" charset="0"/>
+                          <a:cs typeface="Arial" panose="020B0604020202020204" pitchFamily="34" charset="0"/>
+                        </a:rPr>
+                        <a:t>TA4.2 – Tentar gerar um lançamento recorrente de despesa ou receita com categoria ou subcategoria.</a:t>
+                      </a:r>
+                    </a:p>
+                    <a:p>
+                      <a:pPr marL="0" marR="0" lvl="0" indent="0" algn="l" defTabSz="449263" rtl="0" eaLnBrk="1" fontAlgn="base" latinLnBrk="0" hangingPunct="1">
+                        <a:lnSpc>
+                          <a:spcPct val="76000"/>
+                        </a:lnSpc>
+                        <a:spcBef>
+                          <a:spcPts val="400"/>
+                        </a:spcBef>
+                        <a:spcAft>
+                          <a:spcPct val="0"/>
+                        </a:spcAft>
+                        <a:buClrTx/>
+                        <a:buSzPct val="70000"/>
+                        <a:buFontTx/>
+                        <a:buNone/>
+                        <a:tabLst>
+                          <a:tab pos="0" algn="l"/>
+                          <a:tab pos="914400" algn="l"/>
+                          <a:tab pos="1828800" algn="l"/>
+                          <a:tab pos="2743200" algn="l"/>
+                          <a:tab pos="3657600" algn="l"/>
+                          <a:tab pos="4572000" algn="l"/>
+                          <a:tab pos="5486400" algn="l"/>
+                          <a:tab pos="6400800" algn="l"/>
+                          <a:tab pos="7315200" algn="l"/>
+                          <a:tab pos="8229600" algn="l"/>
+                          <a:tab pos="9144000" algn="l"/>
+                          <a:tab pos="10058400" algn="l"/>
+                        </a:tabLst>
+                      </a:pPr>
+                      <a:r>
+                        <a:rPr kumimoji="0" lang="pt-BR" altLang="pt-BR" sz="1000" b="0" i="0" u="none" strike="noStrike" cap="none" normalizeH="0" baseline="0" dirty="0">
+                          <a:ln>
+                            <a:noFill/>
+                          </a:ln>
+                          <a:solidFill>
+                            <a:schemeClr val="tx1"/>
+                          </a:solidFill>
+                          <a:effectLst/>
+                          <a:latin typeface="Arial" panose="020B0604020202020204" pitchFamily="34" charset="0"/>
+                          <a:ea typeface="DejaVu Sans" charset="0"/>
+                          <a:cs typeface="Arial" panose="020B0604020202020204" pitchFamily="34" charset="0"/>
+                        </a:rPr>
+                        <a:t>TA4.3 – Tentar gerar um lançamento recorrente de transferência sem conta origem e destino.</a:t>
+                      </a:r>
+                    </a:p>
+                    <a:p>
+                      <a:pPr marL="0" marR="0" lvl="0" indent="0" algn="l" defTabSz="449263" rtl="0" eaLnBrk="1" fontAlgn="base" latinLnBrk="0" hangingPunct="1">
+                        <a:lnSpc>
+                          <a:spcPct val="76000"/>
+                        </a:lnSpc>
+                        <a:spcBef>
+                          <a:spcPts val="400"/>
+                        </a:spcBef>
+                        <a:spcAft>
+                          <a:spcPct val="0"/>
+                        </a:spcAft>
+                        <a:buClrTx/>
+                        <a:buSzPct val="70000"/>
+                        <a:buFontTx/>
+                        <a:buNone/>
+                        <a:tabLst>
+                          <a:tab pos="0" algn="l"/>
+                          <a:tab pos="914400" algn="l"/>
+                          <a:tab pos="1828800" algn="l"/>
+                          <a:tab pos="2743200" algn="l"/>
+                          <a:tab pos="3657600" algn="l"/>
+                          <a:tab pos="4572000" algn="l"/>
+                          <a:tab pos="5486400" algn="l"/>
+                          <a:tab pos="6400800" algn="l"/>
+                          <a:tab pos="7315200" algn="l"/>
+                          <a:tab pos="8229600" algn="l"/>
+                          <a:tab pos="9144000" algn="l"/>
+                          <a:tab pos="10058400" algn="l"/>
+                        </a:tabLst>
+                      </a:pPr>
+                      <a:r>
+                        <a:rPr kumimoji="0" lang="pt-BR" altLang="pt-BR" sz="1000" b="0" i="0" u="none" strike="noStrike" cap="none" normalizeH="0" baseline="0" dirty="0">
+                          <a:ln>
+                            <a:noFill/>
+                          </a:ln>
+                          <a:solidFill>
+                            <a:schemeClr val="tx1"/>
+                          </a:solidFill>
+                          <a:effectLst/>
+                          <a:latin typeface="Arial" panose="020B0604020202020204" pitchFamily="34" charset="0"/>
+                          <a:ea typeface="DejaVu Sans" charset="0"/>
+                          <a:cs typeface="Arial" panose="020B0604020202020204" pitchFamily="34" charset="0"/>
+                        </a:rPr>
+                        <a:t>TA4.4 – Tentar gerar um lançamento recorrente de transferência com conta origem e destino.</a:t>
+                      </a:r>
+                    </a:p>
+                    <a:p>
+                      <a:pPr marL="0" marR="0" lvl="0" indent="0" algn="l" defTabSz="449263" rtl="0" eaLnBrk="1" fontAlgn="base" latinLnBrk="0" hangingPunct="1">
+                        <a:lnSpc>
+                          <a:spcPct val="76000"/>
+                        </a:lnSpc>
+                        <a:spcBef>
+                          <a:spcPts val="400"/>
+                        </a:spcBef>
+                        <a:spcAft>
+                          <a:spcPct val="0"/>
+                        </a:spcAft>
+                        <a:buClrTx/>
+                        <a:buSzPct val="70000"/>
+                        <a:buFontTx/>
+                        <a:buNone/>
+                        <a:tabLst>
+                          <a:tab pos="0" algn="l"/>
+                          <a:tab pos="914400" algn="l"/>
+                          <a:tab pos="1828800" algn="l"/>
+                          <a:tab pos="2743200" algn="l"/>
+                          <a:tab pos="3657600" algn="l"/>
+                          <a:tab pos="4572000" algn="l"/>
+                          <a:tab pos="5486400" algn="l"/>
+                          <a:tab pos="6400800" algn="l"/>
+                          <a:tab pos="7315200" algn="l"/>
+                          <a:tab pos="8229600" algn="l"/>
+                          <a:tab pos="9144000" algn="l"/>
+                          <a:tab pos="10058400" algn="l"/>
+                        </a:tabLst>
+                      </a:pPr>
+                      <a:r>
+                        <a:rPr kumimoji="0" lang="pt-BR" altLang="pt-BR" sz="1000" b="0" i="0" u="none" strike="noStrike" cap="none" normalizeH="0" baseline="0" dirty="0">
+                          <a:ln>
+                            <a:noFill/>
+                          </a:ln>
+                          <a:solidFill>
+                            <a:schemeClr val="tx1"/>
+                          </a:solidFill>
+                          <a:effectLst/>
+                          <a:latin typeface="Arial" panose="020B0604020202020204" pitchFamily="34" charset="0"/>
+                          <a:ea typeface="DejaVu Sans" charset="0"/>
+                          <a:cs typeface="Arial" panose="020B0604020202020204" pitchFamily="34" charset="0"/>
+                        </a:rPr>
+                        <a:t>TA4.5 – Tentar gerar um lançamento recorrente de despesa ou receita sem uma conta.</a:t>
+                      </a:r>
+                    </a:p>
+                    <a:p>
+                      <a:pPr marL="0" marR="0" lvl="0" indent="0" algn="l" defTabSz="449263" rtl="0" eaLnBrk="1" fontAlgn="base" latinLnBrk="0" hangingPunct="1">
+                        <a:lnSpc>
+                          <a:spcPct val="76000"/>
+                        </a:lnSpc>
+                        <a:spcBef>
+                          <a:spcPts val="400"/>
+                        </a:spcBef>
+                        <a:spcAft>
+                          <a:spcPct val="0"/>
+                        </a:spcAft>
+                        <a:buClrTx/>
+                        <a:buSzPct val="70000"/>
+                        <a:buFontTx/>
+                        <a:buNone/>
+                        <a:tabLst>
+                          <a:tab pos="0" algn="l"/>
+                          <a:tab pos="914400" algn="l"/>
+                          <a:tab pos="1828800" algn="l"/>
+                          <a:tab pos="2743200" algn="l"/>
+                          <a:tab pos="3657600" algn="l"/>
+                          <a:tab pos="4572000" algn="l"/>
+                          <a:tab pos="5486400" algn="l"/>
+                          <a:tab pos="6400800" algn="l"/>
+                          <a:tab pos="7315200" algn="l"/>
+                          <a:tab pos="8229600" algn="l"/>
+                          <a:tab pos="9144000" algn="l"/>
+                          <a:tab pos="10058400" algn="l"/>
+                        </a:tabLst>
+                      </a:pPr>
+                      <a:r>
+                        <a:rPr kumimoji="0" lang="pt-BR" altLang="pt-BR" sz="1000" b="0" i="0" u="none" strike="noStrike" cap="none" normalizeH="0" baseline="0" dirty="0">
+                          <a:ln>
+                            <a:noFill/>
+                          </a:ln>
+                          <a:solidFill>
+                            <a:schemeClr val="tx1"/>
+                          </a:solidFill>
+                          <a:effectLst/>
+                          <a:latin typeface="Arial" panose="020B0604020202020204" pitchFamily="34" charset="0"/>
+                          <a:ea typeface="DejaVu Sans" charset="0"/>
+                          <a:cs typeface="Arial" panose="020B0604020202020204" pitchFamily="34" charset="0"/>
+                        </a:rPr>
+                        <a:t>TA4.6 – Tentar gerar um lançamento recorrente de despesa ou receita com uma conta.</a:t>
+                      </a:r>
+                    </a:p>
+                    <a:p>
+                      <a:pPr marL="0" marR="0" lvl="0" indent="0" algn="l" defTabSz="449263" rtl="0" eaLnBrk="1" fontAlgn="base" latinLnBrk="0" hangingPunct="1">
+                        <a:lnSpc>
+                          <a:spcPct val="76000"/>
+                        </a:lnSpc>
+                        <a:spcBef>
+                          <a:spcPts val="400"/>
+                        </a:spcBef>
+                        <a:spcAft>
+                          <a:spcPct val="0"/>
+                        </a:spcAft>
+                        <a:buClrTx/>
+                        <a:buSzPct val="70000"/>
+                        <a:buFontTx/>
+                        <a:buNone/>
+                        <a:tabLst>
+                          <a:tab pos="0" algn="l"/>
+                          <a:tab pos="914400" algn="l"/>
+                          <a:tab pos="1828800" algn="l"/>
+                          <a:tab pos="2743200" algn="l"/>
+                          <a:tab pos="3657600" algn="l"/>
+                          <a:tab pos="4572000" algn="l"/>
+                          <a:tab pos="5486400" algn="l"/>
+                          <a:tab pos="6400800" algn="l"/>
+                          <a:tab pos="7315200" algn="l"/>
+                          <a:tab pos="8229600" algn="l"/>
+                          <a:tab pos="9144000" algn="l"/>
+                          <a:tab pos="10058400" algn="l"/>
+                        </a:tabLst>
+                      </a:pPr>
+                      <a:r>
+                        <a:rPr kumimoji="0" lang="pt-BR" altLang="pt-BR" sz="1000" b="0" i="0" u="none" strike="noStrike" cap="none" normalizeH="0" baseline="0" dirty="0">
+                          <a:ln>
+                            <a:noFill/>
+                          </a:ln>
+                          <a:solidFill>
+                            <a:schemeClr val="tx1"/>
+                          </a:solidFill>
+                          <a:effectLst/>
+                          <a:latin typeface="Arial" panose="020B0604020202020204" pitchFamily="34" charset="0"/>
+                          <a:ea typeface="DejaVu Sans" charset="0"/>
+                          <a:cs typeface="Arial" panose="020B0604020202020204" pitchFamily="34" charset="0"/>
+                        </a:rPr>
+                        <a:t>TA4.7 – Tentar gerar um lançamento recorrente de transferência sem informar um valor.</a:t>
+                      </a:r>
+                    </a:p>
+                    <a:p>
+                      <a:pPr marL="0" marR="0" lvl="0" indent="0" algn="l" defTabSz="449263" rtl="0" eaLnBrk="1" fontAlgn="base" latinLnBrk="0" hangingPunct="1">
+                        <a:lnSpc>
+                          <a:spcPct val="76000"/>
+                        </a:lnSpc>
+                        <a:spcBef>
+                          <a:spcPts val="400"/>
+                        </a:spcBef>
+                        <a:spcAft>
+                          <a:spcPct val="0"/>
+                        </a:spcAft>
+                        <a:buClrTx/>
+                        <a:buSzPct val="70000"/>
+                        <a:buFontTx/>
+                        <a:buNone/>
+                        <a:tabLst>
+                          <a:tab pos="0" algn="l"/>
+                          <a:tab pos="914400" algn="l"/>
+                          <a:tab pos="1828800" algn="l"/>
+                          <a:tab pos="2743200" algn="l"/>
+                          <a:tab pos="3657600" algn="l"/>
+                          <a:tab pos="4572000" algn="l"/>
+                          <a:tab pos="5486400" algn="l"/>
+                          <a:tab pos="6400800" algn="l"/>
+                          <a:tab pos="7315200" algn="l"/>
+                          <a:tab pos="8229600" algn="l"/>
+                          <a:tab pos="9144000" algn="l"/>
+                          <a:tab pos="10058400" algn="l"/>
+                        </a:tabLst>
+                      </a:pPr>
+                      <a:r>
+                        <a:rPr kumimoji="0" lang="pt-BR" altLang="pt-BR" sz="1000" b="0" i="0" u="none" strike="noStrike" cap="none" normalizeH="0" baseline="0" dirty="0">
+                          <a:ln>
+                            <a:noFill/>
+                          </a:ln>
+                          <a:solidFill>
+                            <a:schemeClr val="tx1"/>
+                          </a:solidFill>
+                          <a:effectLst/>
+                          <a:latin typeface="Arial" panose="020B0604020202020204" pitchFamily="34" charset="0"/>
+                          <a:ea typeface="DejaVu Sans" charset="0"/>
+                          <a:cs typeface="Arial" panose="020B0604020202020204" pitchFamily="34" charset="0"/>
+                        </a:rPr>
+                        <a:t>TA4.8 – Tentar gerar um lançamento recorrente de despesa ou receita sem numero de inicio e final de parcela.</a:t>
+                      </a:r>
                     </a:p>
                     <a:p>
                       <a:pPr marL="0" marR="0" lvl="0" indent="0" algn="l" defTabSz="449263" rtl="0" eaLnBrk="1" fontAlgn="base" latinLnBrk="0" hangingPunct="1">
@@ -7515,16 +8059,305 @@
                           <a:tab pos="9144000" algn="l"/>
                           <a:tab pos="10058400" algn="l"/>
                         </a:tabLst>
+                        <a:defRPr/>
                       </a:pPr>
-                      <a:endParaRPr kumimoji="0" lang="pt-BR" altLang="pt-BR" sz="800" b="1" i="0" u="none" strike="noStrike" cap="none" normalizeH="0" baseline="0" dirty="0">
+                      <a:r>
+                        <a:rPr kumimoji="0" lang="pt-BR" altLang="pt-BR" sz="1000" b="0" i="0" u="none" strike="noStrike" cap="none" normalizeH="0" baseline="0" dirty="0">
+                          <a:ln>
+                            <a:noFill/>
+                          </a:ln>
+                          <a:solidFill>
+                            <a:schemeClr val="tx1"/>
+                          </a:solidFill>
+                          <a:effectLst/>
+                          <a:latin typeface="Arial" panose="020B0604020202020204" pitchFamily="34" charset="0"/>
+                          <a:ea typeface="DejaVu Sans" charset="0"/>
+                          <a:cs typeface="Arial" panose="020B0604020202020204" pitchFamily="34" charset="0"/>
+                        </a:rPr>
+                        <a:t>TA4.9 – Tentar gerar um lançamento recorrente de despesa ou receita com numero de inicio e final de parcela.</a:t>
+                      </a:r>
+                    </a:p>
+                    <a:p>
+                      <a:pPr marL="0" marR="0" lvl="0" indent="0" algn="l" defTabSz="449263" rtl="0" eaLnBrk="1" fontAlgn="base" latinLnBrk="0" hangingPunct="1">
+                        <a:lnSpc>
+                          <a:spcPct val="76000"/>
+                        </a:lnSpc>
+                        <a:spcBef>
+                          <a:spcPts val="400"/>
+                        </a:spcBef>
+                        <a:spcAft>
+                          <a:spcPct val="0"/>
+                        </a:spcAft>
+                        <a:buClrTx/>
+                        <a:buSzPct val="70000"/>
+                        <a:buFontTx/>
+                        <a:buNone/>
+                        <a:tabLst>
+                          <a:tab pos="0" algn="l"/>
+                          <a:tab pos="914400" algn="l"/>
+                          <a:tab pos="1828800" algn="l"/>
+                          <a:tab pos="2743200" algn="l"/>
+                          <a:tab pos="3657600" algn="l"/>
+                          <a:tab pos="4572000" algn="l"/>
+                          <a:tab pos="5486400" algn="l"/>
+                          <a:tab pos="6400800" algn="l"/>
+                          <a:tab pos="7315200" algn="l"/>
+                          <a:tab pos="8229600" algn="l"/>
+                          <a:tab pos="9144000" algn="l"/>
+                          <a:tab pos="10058400" algn="l"/>
+                        </a:tabLst>
+                      </a:pPr>
+                      <a:r>
+                        <a:rPr kumimoji="0" lang="pt-BR" altLang="pt-BR" sz="1000" b="0" i="0" u="none" strike="noStrike" cap="none" normalizeH="0" baseline="0" dirty="0">
+                          <a:ln>
+                            <a:noFill/>
+                          </a:ln>
+                          <a:solidFill>
+                            <a:schemeClr val="tx1"/>
+                          </a:solidFill>
+                          <a:effectLst/>
+                          <a:latin typeface="Arial" panose="020B0604020202020204" pitchFamily="34" charset="0"/>
+                          <a:ea typeface="DejaVu Sans" charset="0"/>
+                          <a:cs typeface="Arial" panose="020B0604020202020204" pitchFamily="34" charset="0"/>
+                        </a:rPr>
+                        <a:t>TA4.10 – Tentar editar um lançamento recorrente de despesa ou receita sem uma conta.</a:t>
+                      </a:r>
+                    </a:p>
+                    <a:p>
+                      <a:pPr marL="0" marR="0" lvl="0" indent="0" algn="l" defTabSz="449263" rtl="0" eaLnBrk="1" fontAlgn="base" latinLnBrk="0" hangingPunct="1">
+                        <a:lnSpc>
+                          <a:spcPct val="76000"/>
+                        </a:lnSpc>
+                        <a:spcBef>
+                          <a:spcPts val="400"/>
+                        </a:spcBef>
+                        <a:spcAft>
+                          <a:spcPct val="0"/>
+                        </a:spcAft>
+                        <a:buClrTx/>
+                        <a:buSzPct val="70000"/>
+                        <a:buFontTx/>
+                        <a:buNone/>
+                        <a:tabLst>
+                          <a:tab pos="0" algn="l"/>
+                          <a:tab pos="914400" algn="l"/>
+                          <a:tab pos="1828800" algn="l"/>
+                          <a:tab pos="2743200" algn="l"/>
+                          <a:tab pos="3657600" algn="l"/>
+                          <a:tab pos="4572000" algn="l"/>
+                          <a:tab pos="5486400" algn="l"/>
+                          <a:tab pos="6400800" algn="l"/>
+                          <a:tab pos="7315200" algn="l"/>
+                          <a:tab pos="8229600" algn="l"/>
+                          <a:tab pos="9144000" algn="l"/>
+                          <a:tab pos="10058400" algn="l"/>
+                        </a:tabLst>
+                      </a:pPr>
+                      <a:r>
+                        <a:rPr kumimoji="0" lang="pt-BR" altLang="pt-BR" sz="1000" b="0" i="0" u="none" strike="noStrike" cap="none" normalizeH="0" baseline="0" dirty="0">
+                          <a:ln>
+                            <a:noFill/>
+                          </a:ln>
+                          <a:solidFill>
+                            <a:schemeClr val="tx1"/>
+                          </a:solidFill>
+                          <a:effectLst/>
+                          <a:latin typeface="Arial" panose="020B0604020202020204" pitchFamily="34" charset="0"/>
+                          <a:ea typeface="DejaVu Sans" charset="0"/>
+                          <a:cs typeface="Arial" panose="020B0604020202020204" pitchFamily="34" charset="0"/>
+                        </a:rPr>
+                        <a:t>TA4.11 – Tentar editar um lançamento recorrente de despesa ou receita com uma conta.</a:t>
+                      </a:r>
+                    </a:p>
+                    <a:p>
+                      <a:pPr marL="0" marR="0" lvl="0" indent="0" algn="l" defTabSz="449263" rtl="0" eaLnBrk="1" fontAlgn="base" latinLnBrk="0" hangingPunct="1">
+                        <a:lnSpc>
+                          <a:spcPct val="76000"/>
+                        </a:lnSpc>
+                        <a:spcBef>
+                          <a:spcPts val="400"/>
+                        </a:spcBef>
+                        <a:spcAft>
+                          <a:spcPct val="0"/>
+                        </a:spcAft>
+                        <a:buClrTx/>
+                        <a:buSzPct val="70000"/>
+                        <a:buFontTx/>
+                        <a:buNone/>
+                        <a:tabLst>
+                          <a:tab pos="0" algn="l"/>
+                          <a:tab pos="914400" algn="l"/>
+                          <a:tab pos="1828800" algn="l"/>
+                          <a:tab pos="2743200" algn="l"/>
+                          <a:tab pos="3657600" algn="l"/>
+                          <a:tab pos="4572000" algn="l"/>
+                          <a:tab pos="5486400" algn="l"/>
+                          <a:tab pos="6400800" algn="l"/>
+                          <a:tab pos="7315200" algn="l"/>
+                          <a:tab pos="8229600" algn="l"/>
+                          <a:tab pos="9144000" algn="l"/>
+                          <a:tab pos="10058400" algn="l"/>
+                        </a:tabLst>
+                      </a:pPr>
+                      <a:r>
+                        <a:rPr kumimoji="0" lang="pt-BR" altLang="pt-BR" sz="1000" b="0" i="0" u="none" strike="noStrike" cap="none" normalizeH="0" baseline="0" dirty="0">
+                          <a:ln>
+                            <a:noFill/>
+                          </a:ln>
+                          <a:solidFill>
+                            <a:schemeClr val="tx1"/>
+                          </a:solidFill>
+                          <a:effectLst/>
+                          <a:latin typeface="Arial" panose="020B0604020202020204" pitchFamily="34" charset="0"/>
+                          <a:ea typeface="DejaVu Sans" charset="0"/>
+                          <a:cs typeface="Arial" panose="020B0604020202020204" pitchFamily="34" charset="0"/>
+                        </a:rPr>
+                        <a:t>TA4.12 – Tentar editar um lançamento recorrente de despesa ou receita sem uma categoria ou subcategoria .</a:t>
+                      </a:r>
+                    </a:p>
+                    <a:p>
+                      <a:pPr marL="0" marR="0" lvl="0" indent="0" algn="l" defTabSz="449263" rtl="0" eaLnBrk="1" fontAlgn="base" latinLnBrk="0" hangingPunct="1">
+                        <a:lnSpc>
+                          <a:spcPct val="76000"/>
+                        </a:lnSpc>
+                        <a:spcBef>
+                          <a:spcPts val="400"/>
+                        </a:spcBef>
+                        <a:spcAft>
+                          <a:spcPct val="0"/>
+                        </a:spcAft>
+                        <a:buClrTx/>
+                        <a:buSzPct val="70000"/>
+                        <a:buFontTx/>
+                        <a:buNone/>
+                        <a:tabLst>
+                          <a:tab pos="0" algn="l"/>
+                          <a:tab pos="914400" algn="l"/>
+                          <a:tab pos="1828800" algn="l"/>
+                          <a:tab pos="2743200" algn="l"/>
+                          <a:tab pos="3657600" algn="l"/>
+                          <a:tab pos="4572000" algn="l"/>
+                          <a:tab pos="5486400" algn="l"/>
+                          <a:tab pos="6400800" algn="l"/>
+                          <a:tab pos="7315200" algn="l"/>
+                          <a:tab pos="8229600" algn="l"/>
+                          <a:tab pos="9144000" algn="l"/>
+                          <a:tab pos="10058400" algn="l"/>
+                        </a:tabLst>
+                      </a:pPr>
+                      <a:r>
+                        <a:rPr kumimoji="0" lang="pt-BR" altLang="pt-BR" sz="1000" b="0" i="0" u="none" strike="noStrike" cap="none" normalizeH="0" baseline="0" dirty="0">
+                          <a:ln>
+                            <a:noFill/>
+                          </a:ln>
+                          <a:solidFill>
+                            <a:schemeClr val="tx1"/>
+                          </a:solidFill>
+                          <a:effectLst/>
+                          <a:latin typeface="Arial" panose="020B0604020202020204" pitchFamily="34" charset="0"/>
+                          <a:ea typeface="DejaVu Sans" charset="0"/>
+                          <a:cs typeface="Arial" panose="020B0604020202020204" pitchFamily="34" charset="0"/>
+                        </a:rPr>
+                        <a:t>TA4.13 – Tentar editar um lançamento recorrente de despesa ou receita com categoria ou subcategoria.</a:t>
+                      </a:r>
+                    </a:p>
+                    <a:p>
+                      <a:pPr marL="0" marR="0" lvl="0" indent="0" algn="l" defTabSz="449263" rtl="0" eaLnBrk="1" fontAlgn="base" latinLnBrk="0" hangingPunct="1">
+                        <a:lnSpc>
+                          <a:spcPct val="76000"/>
+                        </a:lnSpc>
+                        <a:spcBef>
+                          <a:spcPts val="400"/>
+                        </a:spcBef>
+                        <a:spcAft>
+                          <a:spcPct val="0"/>
+                        </a:spcAft>
+                        <a:buClrTx/>
+                        <a:buSzPct val="70000"/>
+                        <a:buFontTx/>
+                        <a:buNone/>
+                        <a:tabLst>
+                          <a:tab pos="0" algn="l"/>
+                          <a:tab pos="914400" algn="l"/>
+                          <a:tab pos="1828800" algn="l"/>
+                          <a:tab pos="2743200" algn="l"/>
+                          <a:tab pos="3657600" algn="l"/>
+                          <a:tab pos="4572000" algn="l"/>
+                          <a:tab pos="5486400" algn="l"/>
+                          <a:tab pos="6400800" algn="l"/>
+                          <a:tab pos="7315200" algn="l"/>
+                          <a:tab pos="8229600" algn="l"/>
+                          <a:tab pos="9144000" algn="l"/>
+                          <a:tab pos="10058400" algn="l"/>
+                        </a:tabLst>
+                      </a:pPr>
+                      <a:r>
+                        <a:rPr kumimoji="0" lang="pt-BR" altLang="pt-BR" sz="1000" b="0" i="0" u="none" strike="noStrike" cap="none" normalizeH="0" baseline="0" dirty="0">
+                          <a:ln>
+                            <a:noFill/>
+                          </a:ln>
+                          <a:solidFill>
+                            <a:schemeClr val="tx1"/>
+                          </a:solidFill>
+                          <a:effectLst/>
+                          <a:latin typeface="Arial" panose="020B0604020202020204" pitchFamily="34" charset="0"/>
+                          <a:ea typeface="DejaVu Sans" charset="0"/>
+                          <a:cs typeface="Arial" panose="020B0604020202020204" pitchFamily="34" charset="0"/>
+                        </a:rPr>
+                        <a:t>TA4.14 – Tentar editar um lançamento recorrente de despesa ou receita sem numero de inicio e final de parcela.</a:t>
+                      </a:r>
+                    </a:p>
+                    <a:p>
+                      <a:pPr marL="0" marR="0" lvl="0" indent="0" algn="l" defTabSz="449263" rtl="0" eaLnBrk="1" fontAlgn="base" latinLnBrk="0" hangingPunct="1">
+                        <a:lnSpc>
+                          <a:spcPct val="76000"/>
+                        </a:lnSpc>
+                        <a:spcBef>
+                          <a:spcPts val="400"/>
+                        </a:spcBef>
+                        <a:spcAft>
+                          <a:spcPct val="0"/>
+                        </a:spcAft>
+                        <a:buClrTx/>
+                        <a:buSzPct val="70000"/>
+                        <a:buFontTx/>
+                        <a:buNone/>
+                        <a:tabLst>
+                          <a:tab pos="0" algn="l"/>
+                          <a:tab pos="914400" algn="l"/>
+                          <a:tab pos="1828800" algn="l"/>
+                          <a:tab pos="2743200" algn="l"/>
+                          <a:tab pos="3657600" algn="l"/>
+                          <a:tab pos="4572000" algn="l"/>
+                          <a:tab pos="5486400" algn="l"/>
+                          <a:tab pos="6400800" algn="l"/>
+                          <a:tab pos="7315200" algn="l"/>
+                          <a:tab pos="8229600" algn="l"/>
+                          <a:tab pos="9144000" algn="l"/>
+                          <a:tab pos="10058400" algn="l"/>
+                        </a:tabLst>
+                      </a:pPr>
+                      <a:r>
+                        <a:rPr kumimoji="0" lang="pt-BR" altLang="pt-BR" sz="1000" b="0" i="0" u="none" strike="noStrike" cap="none" normalizeH="0" baseline="0" dirty="0">
+                          <a:ln>
+                            <a:noFill/>
+                          </a:ln>
+                          <a:solidFill>
+                            <a:schemeClr val="tx1"/>
+                          </a:solidFill>
+                          <a:effectLst/>
+                          <a:latin typeface="Arial" panose="020B0604020202020204" pitchFamily="34" charset="0"/>
+                          <a:ea typeface="DejaVu Sans" charset="0"/>
+                          <a:cs typeface="Arial" panose="020B0604020202020204" pitchFamily="34" charset="0"/>
+                        </a:rPr>
+                        <a:t>TA4.15 – Tentar editar um lançamento recorrente de despesa ou receita com numero de inicio e final de parcela.</a:t>
+                      </a:r>
+                      <a:endParaRPr kumimoji="0" lang="pt-BR" altLang="pt-BR" sz="1000" b="0" i="0" u="none" strike="noStrike" cap="none" normalizeH="0" baseline="0" dirty="0">
                         <a:ln>
                           <a:noFill/>
                         </a:ln>
                         <a:solidFill>
-                          <a:schemeClr val="tx1">
-                            <a:lumMod val="95000"/>
-                            <a:lumOff val="5000"/>
-                          </a:schemeClr>
+                          <a:schemeClr val="tx1"/>
                         </a:solidFill>
                         <a:effectLst/>
                         <a:latin typeface="Arial" panose="020B0604020202020204" pitchFamily="34" charset="0"/>
@@ -7540,7 +8373,7 @@
                   </a:ext>
                 </a:extLst>
               </a:tr>
-              <a:tr h="806738">
+              <a:tr h="382510">
                 <a:tc>
                   <a:txBody>
                     <a:bodyPr/>
@@ -7576,10 +8409,13 @@
                         </a:tabLst>
                       </a:pPr>
                       <a:r>
-                        <a:rPr kumimoji="0" lang="pt-BR" altLang="pt-BR" sz="800" u="none" strike="noStrike" cap="none" normalizeH="0" baseline="0" dirty="0">
+                        <a:rPr kumimoji="0" lang="pt-BR" altLang="pt-BR" sz="1000" b="0" u="none" strike="noStrike" cap="none" normalizeH="0" baseline="0" dirty="0">
                           <a:ln>
                             <a:noFill/>
                           </a:ln>
+                          <a:solidFill>
+                            <a:schemeClr val="tx1"/>
+                          </a:solidFill>
                           <a:effectLst/>
                           <a:latin typeface="Arial" panose="020B0604020202020204" pitchFamily="34" charset="0"/>
                           <a:cs typeface="Arial" panose="020B0604020202020204" pitchFamily="34" charset="0"/>
@@ -7618,10 +8454,13 @@
                         </a:tabLst>
                       </a:pPr>
                       <a:r>
-                        <a:rPr kumimoji="0" lang="pt-BR" altLang="pt-BR" sz="800" u="none" strike="noStrike" cap="none" normalizeH="0" baseline="0" dirty="0">
+                        <a:rPr kumimoji="0" lang="pt-BR" altLang="pt-BR" sz="1000" b="0" u="none" strike="noStrike" cap="none" normalizeH="0" baseline="0" dirty="0">
                           <a:ln>
                             <a:noFill/>
                           </a:ln>
+                          <a:solidFill>
+                            <a:schemeClr val="tx1"/>
+                          </a:solidFill>
                           <a:effectLst/>
                           <a:latin typeface="Arial" panose="020B0604020202020204" pitchFamily="34" charset="0"/>
                           <a:cs typeface="Arial" panose="020B0604020202020204" pitchFamily="34" charset="0"/>
@@ -7629,7 +8468,10 @@
                         <a:t>Periodicidade, Data de inicio, Data fim, iniciar na parcela, </a:t>
                       </a:r>
                       <a:r>
-                        <a:rPr lang="pt-BR" sz="800" kern="1200" dirty="0">
+                        <a:rPr lang="pt-BR" sz="1000" b="0" kern="1200" dirty="0">
+                          <a:solidFill>
+                            <a:schemeClr val="tx1"/>
+                          </a:solidFill>
                           <a:effectLst/>
                           <a:latin typeface="Arial" panose="020B0604020202020204" pitchFamily="34" charset="0"/>
                           <a:cs typeface="Arial" panose="020B0604020202020204" pitchFamily="34" charset="0"/>
@@ -7637,25 +8479,25 @@
                         <a:t>Quantidade de Ocorrência, </a:t>
                       </a:r>
                       <a:r>
-                        <a:rPr kumimoji="0" lang="pt-BR" altLang="pt-BR" sz="800" u="none" strike="noStrike" cap="none" normalizeH="0" baseline="0" dirty="0">
+                        <a:rPr kumimoji="0" lang="pt-BR" altLang="pt-BR" sz="1000" b="0" u="none" strike="noStrike" cap="none" normalizeH="0" baseline="0" dirty="0">
                           <a:ln>
                             <a:noFill/>
                           </a:ln>
+                          <a:solidFill>
+                            <a:schemeClr val="tx1"/>
+                          </a:solidFill>
                           <a:effectLst/>
                           <a:latin typeface="Arial" panose="020B0604020202020204" pitchFamily="34" charset="0"/>
                           <a:cs typeface="Arial" panose="020B0604020202020204" pitchFamily="34" charset="0"/>
                         </a:rPr>
                         <a:t>Valor Total......</a:t>
                       </a:r>
-                      <a:endParaRPr kumimoji="0" lang="pt-BR" altLang="pt-BR" sz="800" b="0" i="0" u="none" strike="noStrike" cap="none" normalizeH="0" baseline="0" dirty="0">
+                      <a:endParaRPr kumimoji="0" lang="pt-BR" altLang="pt-BR" sz="1000" b="0" i="0" u="none" strike="noStrike" cap="none" normalizeH="0" baseline="0" dirty="0">
                         <a:ln>
                           <a:noFill/>
                         </a:ln>
                         <a:solidFill>
-                          <a:schemeClr val="tx1">
-                            <a:lumMod val="95000"/>
-                            <a:lumOff val="5000"/>
-                          </a:schemeClr>
+                          <a:schemeClr val="tx1"/>
                         </a:solidFill>
                         <a:effectLst/>
                         <a:latin typeface="Arial" panose="020B0604020202020204" pitchFamily="34" charset="0"/>
@@ -7671,7 +8513,7 @@
                   </a:ext>
                 </a:extLst>
               </a:tr>
-              <a:tr h="374129">
+              <a:tr h="211153">
                 <a:tc>
                   <a:txBody>
                     <a:bodyPr/>
@@ -7983,25 +8825,25 @@
                         </a:tabLst>
                       </a:pPr>
                       <a:r>
-                        <a:rPr kumimoji="0" lang="pt-BR" altLang="pt-BR" sz="800" u="none" strike="noStrike" cap="none" normalizeH="0" baseline="0" dirty="0">
+                        <a:rPr kumimoji="0" lang="pt-BR" altLang="pt-BR" sz="1000" b="0" u="none" strike="noStrike" cap="none" normalizeH="0" baseline="0" dirty="0">
                           <a:ln>
                             <a:noFill/>
                           </a:ln>
+                          <a:solidFill>
+                            <a:schemeClr val="tx1"/>
+                          </a:solidFill>
                           <a:effectLst/>
                           <a:latin typeface="Arial" panose="020B0604020202020204" pitchFamily="34" charset="0"/>
                           <a:cs typeface="Arial" panose="020B0604020202020204" pitchFamily="34" charset="0"/>
                         </a:rPr>
                         <a:t>Estimativa: ...horas                                           Tempo de Elaboração:  ...horas</a:t>
                       </a:r>
-                      <a:endParaRPr kumimoji="0" lang="pt-BR" altLang="pt-BR" sz="800" b="0" i="1" u="none" strike="noStrike" cap="none" normalizeH="0" baseline="0" dirty="0">
+                      <a:endParaRPr kumimoji="0" lang="pt-BR" altLang="pt-BR" sz="1000" b="0" i="1" u="none" strike="noStrike" cap="none" normalizeH="0" baseline="0" dirty="0">
                         <a:ln>
                           <a:noFill/>
                         </a:ln>
                         <a:solidFill>
-                          <a:schemeClr val="tx1">
-                            <a:lumMod val="95000"/>
-                            <a:lumOff val="5000"/>
-                          </a:schemeClr>
+                          <a:schemeClr val="tx1"/>
                         </a:solidFill>
                         <a:effectLst/>
                         <a:latin typeface="Arial" panose="020B0604020202020204" pitchFamily="34" charset="0"/>
@@ -8089,14 +8931,14 @@
           <p:nvPr>
             <p:extLst>
               <p:ext uri="{D42A27DB-BD31-4B8C-83A1-F6EECF244321}">
-                <p14:modId xmlns:p14="http://schemas.microsoft.com/office/powerpoint/2010/main" val="1041981709"/>
+                <p14:modId xmlns:p14="http://schemas.microsoft.com/office/powerpoint/2010/main" val="2905120726"/>
               </p:ext>
             </p:extLst>
           </p:nvPr>
         </p:nvGraphicFramePr>
         <p:xfrm>
-          <a:off x="117072" y="114300"/>
-          <a:ext cx="11899220" cy="8906715"/>
+          <a:off x="117072" y="114301"/>
+          <a:ext cx="11899220" cy="8244276"/>
         </p:xfrm>
         <a:graphic>
           <a:graphicData uri="http://schemas.openxmlformats.org/drawingml/2006/table">
@@ -8113,7 +8955,7 @@
                   </a:extLst>
                 </a:gridCol>
               </a:tblGrid>
-              <a:tr h="360455">
+              <a:tr h="329968">
                 <a:tc>
                   <a:txBody>
                     <a:bodyPr/>
@@ -8469,7 +9311,7 @@
                   </a:ext>
                 </a:extLst>
               </a:tr>
-              <a:tr h="352121">
+              <a:tr h="322339">
                 <a:tc>
                   <a:txBody>
                     <a:bodyPr/>
@@ -8812,7 +9654,7 @@
                   </a:ext>
                 </a:extLst>
               </a:tr>
-              <a:tr h="1097241">
+              <a:tr h="1004438">
                 <a:tc>
                   <a:txBody>
                     <a:bodyPr/>
@@ -9323,7 +10165,7 @@
                   </a:ext>
                 </a:extLst>
               </a:tr>
-              <a:tr h="3295583">
+              <a:tr h="3016848">
                 <a:tc>
                   <a:txBody>
                     <a:bodyPr/>
@@ -10448,49 +11290,6 @@
                         <a:cs typeface="Arial" panose="020B0604020202020204" pitchFamily="34" charset="0"/>
                       </a:endParaRPr>
                     </a:p>
-                    <a:p>
-                      <a:pPr marL="0" marR="0" lvl="0" indent="0" algn="l" defTabSz="449263" rtl="0" eaLnBrk="1" fontAlgn="base" latinLnBrk="0" hangingPunct="1">
-                        <a:lnSpc>
-                          <a:spcPct val="94000"/>
-                        </a:lnSpc>
-                        <a:spcBef>
-                          <a:spcPts val="450"/>
-                        </a:spcBef>
-                        <a:spcAft>
-                          <a:spcPct val="0"/>
-                        </a:spcAft>
-                        <a:buClrTx/>
-                        <a:buSzPct val="70000"/>
-                        <a:buFontTx/>
-                        <a:buNone/>
-                        <a:tabLst>
-                          <a:tab pos="0" algn="l"/>
-                          <a:tab pos="914400" algn="l"/>
-                          <a:tab pos="1828800" algn="l"/>
-                          <a:tab pos="2743200" algn="l"/>
-                          <a:tab pos="3657600" algn="l"/>
-                          <a:tab pos="4572000" algn="l"/>
-                          <a:tab pos="5486400" algn="l"/>
-                          <a:tab pos="6400800" algn="l"/>
-                          <a:tab pos="7315200" algn="l"/>
-                          <a:tab pos="8229600" algn="l"/>
-                          <a:tab pos="9144000" algn="l"/>
-                          <a:tab pos="10058400" algn="l"/>
-                        </a:tabLst>
-                        <a:defRPr/>
-                      </a:pPr>
-                      <a:endParaRPr kumimoji="0" lang="pt-BR" altLang="pt-BR" sz="800" u="none" strike="noStrike" kern="1200" cap="none" normalizeH="0" baseline="0" dirty="0">
-                        <a:ln>
-                          <a:noFill/>
-                        </a:ln>
-                        <a:solidFill>
-                          <a:srgbClr val="000000"/>
-                        </a:solidFill>
-                        <a:effectLst/>
-                        <a:latin typeface="Arial" panose="020B0604020202020204" pitchFamily="34" charset="0"/>
-                        <a:cs typeface="Arial" panose="020B0604020202020204" pitchFamily="34" charset="0"/>
-                      </a:endParaRPr>
-                    </a:p>
                   </a:txBody>
                   <a:tcPr marT="57823" marB="45726" anchor="ctr" horzOverflow="overflow"/>
                 </a:tc>
@@ -10500,7 +11299,7 @@
                   </a:ext>
                 </a:extLst>
               </a:tr>
-              <a:tr h="505571">
+              <a:tr h="2773969">
                 <a:tc>
                   <a:txBody>
                     <a:bodyPr/>
@@ -11691,48 +12490,6 @@
                         <a:t>.</a:t>
                       </a:r>
                     </a:p>
-                    <a:p>
-                      <a:pPr marL="0" marR="0" lvl="0" indent="0" algn="l" defTabSz="449263" rtl="0" eaLnBrk="1" fontAlgn="base" latinLnBrk="0" hangingPunct="1">
-                        <a:lnSpc>
-                          <a:spcPct val="94000"/>
-                        </a:lnSpc>
-                        <a:spcBef>
-                          <a:spcPts val="350"/>
-                        </a:spcBef>
-                        <a:spcAft>
-                          <a:spcPct val="0"/>
-                        </a:spcAft>
-                        <a:buClrTx/>
-                        <a:buSzPct val="70000"/>
-                        <a:buFontTx/>
-                        <a:buNone/>
-                        <a:tabLst>
-                          <a:tab pos="0" algn="l"/>
-                          <a:tab pos="914400" algn="l"/>
-                          <a:tab pos="1828800" algn="l"/>
-                          <a:tab pos="2743200" algn="l"/>
-                          <a:tab pos="3657600" algn="l"/>
-                          <a:tab pos="4572000" algn="l"/>
-                          <a:tab pos="5486400" algn="l"/>
-                          <a:tab pos="6400800" algn="l"/>
-                          <a:tab pos="7315200" algn="l"/>
-                          <a:tab pos="8229600" algn="l"/>
-                          <a:tab pos="9144000" algn="l"/>
-                          <a:tab pos="10058400" algn="l"/>
-                        </a:tabLst>
-                      </a:pPr>
-                      <a:endParaRPr kumimoji="0" lang="pt-BR" altLang="pt-BR" sz="800" b="1" i="0" u="none" strike="noStrike" cap="none" normalizeH="0" baseline="0" dirty="0">
-                        <a:ln>
-                          <a:noFill/>
-                        </a:ln>
-                        <a:solidFill>
-                          <a:srgbClr val="00B050"/>
-                        </a:solidFill>
-                        <a:effectLst/>
-                        <a:latin typeface="Arial" panose="020B0604020202020204" pitchFamily="34" charset="0"/>
-                        <a:cs typeface="Arial" panose="020B0604020202020204" pitchFamily="34" charset="0"/>
-                      </a:endParaRPr>
-                    </a:p>
                   </a:txBody>
                   <a:tcPr marT="57823" marB="45726" anchor="ctr" horzOverflow="overflow"/>
                 </a:tc>
@@ -11742,7 +12499,7 @@
                   </a:ext>
                 </a:extLst>
               </a:tr>
-              <a:tr h="525957">
+              <a:tr h="481472">
                 <a:tc>
                   <a:txBody>
                     <a:bodyPr/>
@@ -11870,7 +12627,7 @@
                   </a:ext>
                 </a:extLst>
               </a:tr>
-              <a:tr h="245094">
+              <a:tr h="224364">
                 <a:tc>
                   <a:txBody>
                     <a:bodyPr/>
@@ -12285,14 +13042,14 @@
           <p:nvPr>
             <p:extLst>
               <p:ext uri="{D42A27DB-BD31-4B8C-83A1-F6EECF244321}">
-                <p14:modId xmlns:p14="http://schemas.microsoft.com/office/powerpoint/2010/main" val="3713938778"/>
+                <p14:modId xmlns:p14="http://schemas.microsoft.com/office/powerpoint/2010/main" val="715418448"/>
               </p:ext>
             </p:extLst>
           </p:nvPr>
         </p:nvGraphicFramePr>
         <p:xfrm>
-          <a:off x="129952" y="114300"/>
-          <a:ext cx="11856102" cy="6382022"/>
+          <a:off x="167949" y="165817"/>
+          <a:ext cx="11856102" cy="4691295"/>
         </p:xfrm>
         <a:graphic>
           <a:graphicData uri="http://schemas.openxmlformats.org/drawingml/2006/table">
@@ -12309,7 +13066,7 @@
                   </a:extLst>
                 </a:gridCol>
               </a:tblGrid>
-              <a:tr h="360455">
+              <a:tr h="209093">
                 <a:tc>
                   <a:txBody>
                     <a:bodyPr/>
@@ -12621,7 +13378,7 @@
                         </a:tabLst>
                       </a:pPr>
                       <a:r>
-                        <a:rPr kumimoji="0" lang="pt-BR" altLang="pt-BR" sz="800" u="none" strike="noStrike" kern="1200" cap="none" normalizeH="0" baseline="0" dirty="0">
+                        <a:rPr kumimoji="0" lang="pt-BR" altLang="pt-BR" sz="1100" b="0" i="0" u="none" strike="noStrike" kern="1200" cap="none" normalizeH="0" baseline="0" dirty="0">
                           <a:ln>
                             <a:noFill/>
                           </a:ln>
@@ -12631,7 +13388,7 @@
                         </a:rPr>
                         <a:t>US07 – NOTIFICAR ALERTAS PARA LEMBRAR UM LANÇAMENTO PENDENTE</a:t>
                       </a:r>
-                      <a:endParaRPr kumimoji="0" lang="pt-BR" altLang="pt-BR" sz="800" b="1" u="none" strike="noStrike" kern="1200" cap="none" normalizeH="0" baseline="0" dirty="0">
+                      <a:endParaRPr kumimoji="0" lang="pt-BR" altLang="pt-BR" sz="1100" b="0" i="0" u="none" strike="noStrike" kern="1200" cap="none" normalizeH="0" baseline="0" dirty="0">
                         <a:ln>
                           <a:noFill/>
                         </a:ln>
@@ -12654,7 +13411,7 @@
                   </a:ext>
                 </a:extLst>
               </a:tr>
-              <a:tr h="352121">
+              <a:tr h="207654">
                 <a:tc>
                   <a:txBody>
                     <a:bodyPr/>
@@ -12966,7 +13723,7 @@
                         </a:tabLst>
                       </a:pPr>
                       <a:r>
-                        <a:rPr kumimoji="0" lang="pt-BR" altLang="pt-BR" sz="800" u="none" strike="noStrike" kern="1200" cap="none" normalizeH="0" baseline="0" dirty="0">
+                        <a:rPr kumimoji="0" lang="pt-BR" altLang="pt-BR" sz="1100" b="0" i="0" u="none" strike="noStrike" kern="1200" cap="none" normalizeH="0" baseline="0" dirty="0">
                           <a:ln>
                             <a:noFill/>
                           </a:ln>
@@ -12986,7 +13743,7 @@
                   </a:ext>
                 </a:extLst>
               </a:tr>
-              <a:tr h="1097241">
+              <a:tr h="546723">
                 <a:tc>
                   <a:txBody>
                     <a:bodyPr/>
@@ -13298,7 +14055,7 @@
                         </a:tabLst>
                       </a:pPr>
                       <a:r>
-                        <a:rPr kumimoji="0" lang="pt-BR" altLang="pt-BR" sz="800" u="none" strike="noStrike" kern="1200" cap="none" normalizeH="0" baseline="0" dirty="0">
+                        <a:rPr kumimoji="0" lang="pt-BR" altLang="pt-BR" sz="1100" b="0" i="0" u="none" strike="noStrike" kern="1200" cap="none" normalizeH="0" baseline="0" dirty="0">
                           <a:ln>
                             <a:noFill/>
                           </a:ln>
@@ -13340,7 +14097,7 @@
                         </a:tabLst>
                       </a:pPr>
                       <a:r>
-                        <a:rPr kumimoji="0" lang="pt-BR" altLang="pt-BR" sz="800" u="none" strike="noStrike" kern="1200" cap="none" normalizeH="0" baseline="0" dirty="0">
+                        <a:rPr kumimoji="0" lang="pt-BR" altLang="pt-BR" sz="1100" b="0" i="0" u="none" strike="noStrike" kern="1200" cap="none" normalizeH="0" baseline="0" dirty="0">
                           <a:ln>
                             <a:noFill/>
                           </a:ln>
@@ -13382,7 +14139,7 @@
                         </a:tabLst>
                       </a:pPr>
                       <a:r>
-                        <a:rPr kumimoji="0" lang="pt-BR" altLang="pt-BR" sz="800" u="none" strike="noStrike" kern="1200" cap="none" normalizeH="0" baseline="0" dirty="0">
+                        <a:rPr kumimoji="0" lang="pt-BR" altLang="pt-BR" sz="1100" b="0" i="0" u="none" strike="noStrike" kern="1200" cap="none" normalizeH="0" baseline="0" dirty="0">
                           <a:ln>
                             <a:noFill/>
                           </a:ln>
@@ -13402,7 +14159,7 @@
                   </a:ext>
                 </a:extLst>
               </a:tr>
-              <a:tr h="3295583">
+              <a:tr h="1054781">
                 <a:tc>
                   <a:txBody>
                     <a:bodyPr/>
@@ -13714,7 +14471,7 @@
                         </a:tabLst>
                       </a:pPr>
                       <a:r>
-                        <a:rPr kumimoji="0" lang="pt-BR" altLang="pt-BR" sz="800" u="none" strike="noStrike" kern="1200" cap="none" normalizeH="0" baseline="0" dirty="0">
+                        <a:rPr kumimoji="0" lang="pt-BR" altLang="pt-BR" sz="1100" b="0" i="0" u="none" strike="noStrike" kern="1200" cap="none" normalizeH="0" baseline="0" dirty="0">
                           <a:ln>
                             <a:noFill/>
                           </a:ln>
@@ -13756,7 +14513,7 @@
                         </a:tabLst>
                       </a:pPr>
                       <a:r>
-                        <a:rPr kumimoji="0" lang="pt-BR" altLang="pt-BR" sz="800" u="none" strike="noStrike" kern="1200" cap="none" normalizeH="0" baseline="0" dirty="0">
+                        <a:rPr kumimoji="0" lang="pt-BR" altLang="pt-BR" sz="1100" b="0" i="0" u="none" strike="noStrike" kern="1200" cap="none" normalizeH="0" baseline="0" dirty="0">
                           <a:ln>
                             <a:noFill/>
                           </a:ln>
@@ -13764,7 +14521,7 @@
                           <a:latin typeface="Arial" panose="020B0604020202020204" pitchFamily="34" charset="0"/>
                           <a:cs typeface="Arial" panose="020B0604020202020204" pitchFamily="34" charset="0"/>
                         </a:rPr>
-                        <a:t>RN71 – A criação de uma notificação de alerta está associada a um lançamento específico.</a:t>
+                        <a:t>RN7.1 – A criação de uma notificação de alerta está associada a um lançamento específico.</a:t>
                       </a:r>
                     </a:p>
                     <a:p>
@@ -13798,7 +14555,7 @@
                         </a:tabLst>
                       </a:pPr>
                       <a:r>
-                        <a:rPr kumimoji="0" lang="pt-BR" altLang="pt-BR" sz="800" u="none" strike="noStrike" kern="1200" cap="none" normalizeH="0" baseline="0" dirty="0">
+                        <a:rPr kumimoji="0" lang="pt-BR" altLang="pt-BR" sz="1100" b="0" i="0" u="none" strike="noStrike" kern="1200" cap="none" normalizeH="0" baseline="0" dirty="0">
                           <a:ln>
                             <a:noFill/>
                           </a:ln>
@@ -13806,7 +14563,7 @@
                           <a:latin typeface="Arial" panose="020B0604020202020204" pitchFamily="34" charset="0"/>
                           <a:cs typeface="Arial" panose="020B0604020202020204" pitchFamily="34" charset="0"/>
                         </a:rPr>
-                        <a:t>RN72 – Para editar uma notificação de alerta, precisa editar primeiro o lançamento ao qual estará associada a notificação de alerta.</a:t>
+                        <a:t>RN7.2 – Para editar uma notificação de alerta, precisa editar primeiro o lançamento ao qual estará associada a notificação de alerta.</a:t>
                       </a:r>
                     </a:p>
                     <a:p>
@@ -13840,7 +14597,7 @@
                         </a:tabLst>
                       </a:pPr>
                       <a:r>
-                        <a:rPr kumimoji="0" lang="pt-BR" altLang="pt-BR" sz="800" u="none" strike="noStrike" kern="1200" cap="none" normalizeH="0" baseline="0" dirty="0">
+                        <a:rPr kumimoji="0" lang="pt-BR" altLang="pt-BR" sz="1100" b="0" i="0" u="none" strike="noStrike" kern="1200" cap="none" normalizeH="0" baseline="0" dirty="0">
                           <a:ln>
                             <a:noFill/>
                           </a:ln>
@@ -13848,7 +14605,7 @@
                           <a:latin typeface="Arial" panose="020B0604020202020204" pitchFamily="34" charset="0"/>
                           <a:cs typeface="Arial" panose="020B0604020202020204" pitchFamily="34" charset="0"/>
                         </a:rPr>
-                        <a:t>RN72 – A notificação pode ser configurada para alertar N minutos, horas, dias ou semanas antes da data e hora do lançamento em questão.</a:t>
+                        <a:t>RN7.3 – A notificação pode ser configurada para alertar N minutos, horas, dias ou semanas antes da data e hora do lançamento em questão.</a:t>
                       </a:r>
                     </a:p>
                     <a:p>
@@ -13882,7 +14639,7 @@
                         </a:tabLst>
                       </a:pPr>
                       <a:r>
-                        <a:rPr kumimoji="0" lang="pt-BR" altLang="pt-BR" sz="800" u="none" strike="noStrike" kern="1200" cap="none" normalizeH="0" baseline="0" dirty="0">
+                        <a:rPr kumimoji="0" lang="pt-BR" altLang="pt-BR" sz="1100" b="0" i="0" u="none" strike="noStrike" kern="1200" cap="none" normalizeH="0" baseline="0" dirty="0">
                           <a:ln>
                             <a:noFill/>
                           </a:ln>
@@ -13890,7 +14647,7 @@
                           <a:latin typeface="Arial" panose="020B0604020202020204" pitchFamily="34" charset="0"/>
                           <a:cs typeface="Arial" panose="020B0604020202020204" pitchFamily="34" charset="0"/>
                         </a:rPr>
-                        <a:t>RN73 – A notificação deve ser visualizada na área de notificações do produto de software.</a:t>
+                        <a:t>RN7.4 – A notificação deve ser visualizada na área de notificações do produto de software.</a:t>
                       </a:r>
                     </a:p>
                     <a:p>
@@ -13922,51 +14679,9 @@
                           <a:tab pos="9144000" algn="l"/>
                           <a:tab pos="10058400" algn="l"/>
                         </a:tabLst>
-                      </a:pPr>
-                      <a:r>
-                        <a:rPr kumimoji="0" lang="pt-BR" altLang="pt-BR" sz="800" u="none" strike="noStrike" kern="1200" cap="none" normalizeH="0" baseline="0" dirty="0">
-                          <a:ln>
-                            <a:noFill/>
-                          </a:ln>
-                          <a:effectLst/>
-                          <a:latin typeface="Arial" panose="020B0604020202020204" pitchFamily="34" charset="0"/>
-                          <a:cs typeface="Arial" panose="020B0604020202020204" pitchFamily="34" charset="0"/>
-                        </a:rPr>
-                        <a:t>RN74 - ...</a:t>
-                      </a:r>
-                    </a:p>
-                    <a:p>
-                      <a:pPr marL="0" marR="0" lvl="0" indent="0" algn="l" defTabSz="449263" rtl="0" eaLnBrk="1" fontAlgn="base" latinLnBrk="0" hangingPunct="1">
-                        <a:lnSpc>
-                          <a:spcPct val="94000"/>
-                        </a:lnSpc>
-                        <a:spcBef>
-                          <a:spcPts val="450"/>
-                        </a:spcBef>
-                        <a:spcAft>
-                          <a:spcPct val="0"/>
-                        </a:spcAft>
-                        <a:buClrTx/>
-                        <a:buSzPct val="70000"/>
-                        <a:buFontTx/>
-                        <a:buNone/>
-                        <a:tabLst>
-                          <a:tab pos="0" algn="l"/>
-                          <a:tab pos="914400" algn="l"/>
-                          <a:tab pos="1828800" algn="l"/>
-                          <a:tab pos="2743200" algn="l"/>
-                          <a:tab pos="3657600" algn="l"/>
-                          <a:tab pos="4572000" algn="l"/>
-                          <a:tab pos="5486400" algn="l"/>
-                          <a:tab pos="6400800" algn="l"/>
-                          <a:tab pos="7315200" algn="l"/>
-                          <a:tab pos="8229600" algn="l"/>
-                          <a:tab pos="9144000" algn="l"/>
-                          <a:tab pos="10058400" algn="l"/>
-                        </a:tabLst>
                         <a:defRPr/>
                       </a:pPr>
-                      <a:endParaRPr kumimoji="0" lang="pt-BR" altLang="pt-BR" sz="800" u="none" strike="noStrike" kern="1200" cap="none" normalizeH="0" baseline="0" dirty="0">
+                      <a:endParaRPr kumimoji="0" lang="pt-BR" altLang="pt-BR" sz="1100" b="0" i="0" u="none" strike="noStrike" kern="1200" cap="none" normalizeH="0" baseline="0" dirty="0">
                         <a:ln>
                           <a:noFill/>
                         </a:ln>
@@ -13987,7 +14702,7 @@
                   </a:ext>
                 </a:extLst>
               </a:tr>
-              <a:tr h="505571">
+              <a:tr h="1043237">
                 <a:tc>
                   <a:txBody>
                     <a:bodyPr/>
@@ -14299,7 +15014,7 @@
                         </a:tabLst>
                       </a:pPr>
                       <a:r>
-                        <a:rPr kumimoji="0" lang="pt-BR" altLang="pt-BR" sz="800" u="none" strike="noStrike" kern="1200" cap="none" normalizeH="0" baseline="0" dirty="0">
+                        <a:rPr kumimoji="0" lang="pt-BR" altLang="pt-BR" sz="1100" b="0" i="0" u="none" strike="noStrike" kern="1200" cap="none" normalizeH="0" baseline="0" dirty="0">
                           <a:ln>
                             <a:noFill/>
                           </a:ln>
@@ -14316,7 +15031,7 @@
                           <a:spcPct val="94000"/>
                         </a:lnSpc>
                         <a:spcBef>
-                          <a:spcPts val="350"/>
+                          <a:spcPts val="450"/>
                         </a:spcBef>
                         <a:spcAft>
                           <a:spcPct val="0"/>
@@ -14340,7 +15055,175 @@
                           <a:tab pos="10058400" algn="l"/>
                         </a:tabLst>
                       </a:pPr>
-                      <a:endParaRPr kumimoji="0" lang="pt-BR" altLang="pt-BR" sz="800" b="1" i="0" u="none" strike="noStrike" cap="none" normalizeH="0" baseline="0" dirty="0">
+                      <a:r>
+                        <a:rPr kumimoji="0" lang="pt-BR" altLang="pt-BR" sz="1100" b="0" i="0" u="none" strike="noStrike" kern="1200" cap="none" normalizeH="0" baseline="0" dirty="0">
+                          <a:ln>
+                            <a:noFill/>
+                          </a:ln>
+                          <a:effectLst/>
+                          <a:latin typeface="Arial" panose="020B0604020202020204" pitchFamily="34" charset="0"/>
+                          <a:cs typeface="Arial" panose="020B0604020202020204" pitchFamily="34" charset="0"/>
+                        </a:rPr>
+                        <a:t>TA7.1 – Tentar editar uma notificação sem determinar o tempo.  </a:t>
+                      </a:r>
+                    </a:p>
+                    <a:p>
+                      <a:pPr marL="0" marR="0" lvl="0" indent="0" algn="l" defTabSz="449263" rtl="0" eaLnBrk="1" fontAlgn="base" latinLnBrk="0" hangingPunct="1">
+                        <a:lnSpc>
+                          <a:spcPct val="94000"/>
+                        </a:lnSpc>
+                        <a:spcBef>
+                          <a:spcPts val="450"/>
+                        </a:spcBef>
+                        <a:spcAft>
+                          <a:spcPct val="0"/>
+                        </a:spcAft>
+                        <a:buClrTx/>
+                        <a:buSzPct val="70000"/>
+                        <a:buFontTx/>
+                        <a:buNone/>
+                        <a:tabLst>
+                          <a:tab pos="0" algn="l"/>
+                          <a:tab pos="914400" algn="l"/>
+                          <a:tab pos="1828800" algn="l"/>
+                          <a:tab pos="2743200" algn="l"/>
+                          <a:tab pos="3657600" algn="l"/>
+                          <a:tab pos="4572000" algn="l"/>
+                          <a:tab pos="5486400" algn="l"/>
+                          <a:tab pos="6400800" algn="l"/>
+                          <a:tab pos="7315200" algn="l"/>
+                          <a:tab pos="8229600" algn="l"/>
+                          <a:tab pos="9144000" algn="l"/>
+                          <a:tab pos="10058400" algn="l"/>
+                        </a:tabLst>
+                      </a:pPr>
+                      <a:r>
+                        <a:rPr kumimoji="0" lang="pt-BR" altLang="pt-BR" sz="1100" b="0" i="0" u="none" strike="noStrike" kern="1200" cap="none" normalizeH="0" baseline="0" dirty="0">
+                          <a:ln>
+                            <a:noFill/>
+                          </a:ln>
+                          <a:effectLst/>
+                          <a:latin typeface="Arial" panose="020B0604020202020204" pitchFamily="34" charset="0"/>
+                          <a:cs typeface="Arial" panose="020B0604020202020204" pitchFamily="34" charset="0"/>
+                        </a:rPr>
+                        <a:t>TA7.2 – Tentar editar uma notificação com um tempo determinado.</a:t>
+                      </a:r>
+                    </a:p>
+                    <a:p>
+                      <a:pPr marL="0" marR="0" lvl="0" indent="0" algn="l" defTabSz="449263" rtl="0" eaLnBrk="1" fontAlgn="base" latinLnBrk="0" hangingPunct="1">
+                        <a:lnSpc>
+                          <a:spcPct val="94000"/>
+                        </a:lnSpc>
+                        <a:spcBef>
+                          <a:spcPts val="450"/>
+                        </a:spcBef>
+                        <a:spcAft>
+                          <a:spcPct val="0"/>
+                        </a:spcAft>
+                        <a:buClrTx/>
+                        <a:buSzPct val="70000"/>
+                        <a:buFontTx/>
+                        <a:buNone/>
+                        <a:tabLst>
+                          <a:tab pos="0" algn="l"/>
+                          <a:tab pos="914400" algn="l"/>
+                          <a:tab pos="1828800" algn="l"/>
+                          <a:tab pos="2743200" algn="l"/>
+                          <a:tab pos="3657600" algn="l"/>
+                          <a:tab pos="4572000" algn="l"/>
+                          <a:tab pos="5486400" algn="l"/>
+                          <a:tab pos="6400800" algn="l"/>
+                          <a:tab pos="7315200" algn="l"/>
+                          <a:tab pos="8229600" algn="l"/>
+                          <a:tab pos="9144000" algn="l"/>
+                          <a:tab pos="10058400" algn="l"/>
+                        </a:tabLst>
+                      </a:pPr>
+                      <a:r>
+                        <a:rPr kumimoji="0" lang="pt-BR" altLang="pt-BR" sz="1100" b="0" i="0" u="none" strike="noStrike" kern="1200" cap="none" normalizeH="0" baseline="0" dirty="0">
+                          <a:ln>
+                            <a:noFill/>
+                          </a:ln>
+                          <a:effectLst/>
+                          <a:latin typeface="Arial" panose="020B0604020202020204" pitchFamily="34" charset="0"/>
+                          <a:cs typeface="Arial" panose="020B0604020202020204" pitchFamily="34" charset="0"/>
+                        </a:rPr>
+                        <a:t>TA7.3 – Tentar criar uma notificação sem determinar o tempo.  </a:t>
+                      </a:r>
+                    </a:p>
+                    <a:p>
+                      <a:pPr marL="0" marR="0" lvl="0" indent="0" algn="l" defTabSz="449263" rtl="0" eaLnBrk="1" fontAlgn="base" latinLnBrk="0" hangingPunct="1">
+                        <a:lnSpc>
+                          <a:spcPct val="94000"/>
+                        </a:lnSpc>
+                        <a:spcBef>
+                          <a:spcPts val="450"/>
+                        </a:spcBef>
+                        <a:spcAft>
+                          <a:spcPct val="0"/>
+                        </a:spcAft>
+                        <a:buClrTx/>
+                        <a:buSzPct val="70000"/>
+                        <a:buFontTx/>
+                        <a:buNone/>
+                        <a:tabLst>
+                          <a:tab pos="0" algn="l"/>
+                          <a:tab pos="914400" algn="l"/>
+                          <a:tab pos="1828800" algn="l"/>
+                          <a:tab pos="2743200" algn="l"/>
+                          <a:tab pos="3657600" algn="l"/>
+                          <a:tab pos="4572000" algn="l"/>
+                          <a:tab pos="5486400" algn="l"/>
+                          <a:tab pos="6400800" algn="l"/>
+                          <a:tab pos="7315200" algn="l"/>
+                          <a:tab pos="8229600" algn="l"/>
+                          <a:tab pos="9144000" algn="l"/>
+                          <a:tab pos="10058400" algn="l"/>
+                        </a:tabLst>
+                      </a:pPr>
+                      <a:r>
+                        <a:rPr kumimoji="0" lang="pt-BR" altLang="pt-BR" sz="1100" b="0" i="0" u="none" strike="noStrike" kern="1200" cap="none" normalizeH="0" baseline="0" dirty="0">
+                          <a:ln>
+                            <a:noFill/>
+                          </a:ln>
+                          <a:effectLst/>
+                          <a:latin typeface="Arial" panose="020B0604020202020204" pitchFamily="34" charset="0"/>
+                          <a:cs typeface="Arial" panose="020B0604020202020204" pitchFamily="34" charset="0"/>
+                        </a:rPr>
+                        <a:t>TA7.4 – Tentar criar uma notificação com um tempo determinado.</a:t>
+                      </a:r>
+                    </a:p>
+                    <a:p>
+                      <a:pPr marL="0" marR="0" lvl="0" indent="0" algn="l" defTabSz="449263" rtl="0" eaLnBrk="1" fontAlgn="base" latinLnBrk="0" hangingPunct="1">
+                        <a:lnSpc>
+                          <a:spcPct val="94000"/>
+                        </a:lnSpc>
+                        <a:spcBef>
+                          <a:spcPts val="350"/>
+                        </a:spcBef>
+                        <a:spcAft>
+                          <a:spcPct val="0"/>
+                        </a:spcAft>
+                        <a:buClrTx/>
+                        <a:buSzPct val="70000"/>
+                        <a:buFontTx/>
+                        <a:buNone/>
+                        <a:tabLst>
+                          <a:tab pos="0" algn="l"/>
+                          <a:tab pos="914400" algn="l"/>
+                          <a:tab pos="1828800" algn="l"/>
+                          <a:tab pos="2743200" algn="l"/>
+                          <a:tab pos="3657600" algn="l"/>
+                          <a:tab pos="4572000" algn="l"/>
+                          <a:tab pos="5486400" algn="l"/>
+                          <a:tab pos="6400800" algn="l"/>
+                          <a:tab pos="7315200" algn="l"/>
+                          <a:tab pos="8229600" algn="l"/>
+                          <a:tab pos="9144000" algn="l"/>
+                          <a:tab pos="10058400" algn="l"/>
+                        </a:tabLst>
+                      </a:pPr>
+                      <a:endParaRPr kumimoji="0" lang="pt-BR" altLang="pt-BR" sz="1100" b="0" i="0" u="none" strike="noStrike" cap="none" normalizeH="0" baseline="0" dirty="0">
                         <a:ln>
                           <a:noFill/>
                         </a:ln>
@@ -14361,7 +15244,7 @@
                   </a:ext>
                 </a:extLst>
               </a:tr>
-              <a:tr h="525957">
+              <a:tr h="377188">
                 <a:tc>
                   <a:txBody>
                     <a:bodyPr/>
@@ -14397,7 +15280,7 @@
                         </a:tabLst>
                       </a:pPr>
                       <a:r>
-                        <a:rPr kumimoji="0" lang="pt-BR" altLang="pt-BR" sz="800" u="none" strike="noStrike" kern="1200" cap="none" normalizeH="0" baseline="0" dirty="0">
+                        <a:rPr kumimoji="0" lang="pt-BR" altLang="pt-BR" sz="1100" b="0" i="0" u="none" strike="noStrike" kern="1200" cap="none" normalizeH="0" baseline="0" dirty="0">
                           <a:ln>
                             <a:noFill/>
                           </a:ln>
@@ -14439,7 +15322,7 @@
                         </a:tabLst>
                       </a:pPr>
                       <a:r>
-                        <a:rPr lang="pt-BR" sz="800" dirty="0">
+                        <a:rPr lang="pt-BR" sz="1100" b="0" i="0" dirty="0">
                           <a:latin typeface="Arial" panose="020B0604020202020204" pitchFamily="34" charset="0"/>
                           <a:cs typeface="Arial" panose="020B0604020202020204" pitchFamily="34" charset="0"/>
                         </a:rPr>
@@ -14455,7 +15338,7 @@
                   </a:ext>
                 </a:extLst>
               </a:tr>
-              <a:tr h="245094">
+              <a:tr h="207654">
                 <a:tc>
                   <a:txBody>
                     <a:bodyPr/>
@@ -14767,7 +15650,7 @@
                         </a:tabLst>
                       </a:pPr>
                       <a:r>
-                        <a:rPr kumimoji="0" lang="pt-BR" altLang="pt-BR" sz="800" u="none" strike="noStrike" kern="1200" cap="none" normalizeH="0" baseline="0" dirty="0">
+                        <a:rPr kumimoji="0" lang="pt-BR" altLang="pt-BR" sz="1100" b="0" i="0" u="none" strike="noStrike" kern="1200" cap="none" normalizeH="0" baseline="0" dirty="0">
                           <a:ln>
                             <a:noFill/>
                           </a:ln>
@@ -14777,7 +15660,7 @@
                         </a:rPr>
                         <a:t>Estimativa: ...horas                                           Tempo de Elaboração:  ...horas</a:t>
                       </a:r>
-                      <a:endParaRPr kumimoji="0" lang="pt-BR" altLang="pt-BR" sz="800" u="none" strike="noStrike" kern="1200" cap="none" normalizeH="0" baseline="0" dirty="0">
+                      <a:endParaRPr kumimoji="0" lang="pt-BR" altLang="pt-BR" sz="1100" b="0" i="0" u="none" strike="noStrike" kern="1200" cap="none" normalizeH="0" baseline="0" dirty="0">
                         <a:ln>
                           <a:noFill/>
                         </a:ln>
@@ -14847,14 +15730,14 @@
           <p:nvPr>
             <p:extLst>
               <p:ext uri="{D42A27DB-BD31-4B8C-83A1-F6EECF244321}">
-                <p14:modId xmlns:p14="http://schemas.microsoft.com/office/powerpoint/2010/main" val="2720540347"/>
+                <p14:modId xmlns:p14="http://schemas.microsoft.com/office/powerpoint/2010/main" val="1149054500"/>
               </p:ext>
             </p:extLst>
           </p:nvPr>
         </p:nvGraphicFramePr>
         <p:xfrm>
           <a:off x="155618" y="134958"/>
-          <a:ext cx="11805723" cy="6393535"/>
+          <a:ext cx="11805723" cy="5475616"/>
         </p:xfrm>
         <a:graphic>
           <a:graphicData uri="http://schemas.openxmlformats.org/drawingml/2006/table">
@@ -14871,7 +15754,7 @@
                   </a:extLst>
                 </a:gridCol>
               </a:tblGrid>
-              <a:tr h="360455">
+              <a:tr h="174075">
                 <a:tc>
                   <a:txBody>
                     <a:bodyPr/>
@@ -15183,29 +16066,19 @@
                         </a:tabLst>
                       </a:pPr>
                       <a:r>
-                        <a:rPr kumimoji="0" lang="pt-BR" altLang="pt-BR" sz="800" u="none" strike="noStrike" kern="1200" cap="none" normalizeH="0" baseline="0" dirty="0">
+                        <a:rPr kumimoji="0" lang="pt-BR" altLang="pt-BR" sz="1100" b="0" u="none" strike="noStrike" kern="1200" cap="none" normalizeH="0" baseline="0" dirty="0">
                           <a:ln>
                             <a:noFill/>
                           </a:ln>
+                          <a:solidFill>
+                            <a:schemeClr val="tx1"/>
+                          </a:solidFill>
                           <a:effectLst/>
                           <a:latin typeface="Arial" panose="020B0604020202020204" pitchFamily="34" charset="0"/>
                           <a:cs typeface="Arial" panose="020B0604020202020204" pitchFamily="34" charset="0"/>
                         </a:rPr>
                         <a:t>US08 – VISUALIZAR LANÇAMENTOS</a:t>
                       </a:r>
-                      <a:endParaRPr kumimoji="0" lang="pt-BR" altLang="pt-BR" sz="800" b="1" u="none" strike="noStrike" kern="1200" cap="none" normalizeH="0" baseline="0" dirty="0">
-                        <a:ln>
-                          <a:noFill/>
-                        </a:ln>
-                        <a:solidFill>
-                          <a:schemeClr val="accent6">
-                            <a:lumMod val="75000"/>
-                          </a:schemeClr>
-                        </a:solidFill>
-                        <a:effectLst/>
-                        <a:latin typeface="Arial" panose="020B0604020202020204" pitchFamily="34" charset="0"/>
-                        <a:cs typeface="Arial" panose="020B0604020202020204" pitchFamily="34" charset="0"/>
-                      </a:endParaRPr>
                     </a:p>
                   </a:txBody>
                   <a:tcPr marT="59335" marB="45726" anchor="ctr" horzOverflow="overflow"/>
@@ -15216,7 +16089,7 @@
                   </a:ext>
                 </a:extLst>
               </a:tr>
-              <a:tr h="352121">
+              <a:tr h="172877">
                 <a:tc>
                   <a:txBody>
                     <a:bodyPr/>
@@ -15528,10 +16401,13 @@
                         </a:tabLst>
                       </a:pPr>
                       <a:r>
-                        <a:rPr kumimoji="0" lang="pt-BR" altLang="pt-BR" sz="800" u="none" strike="noStrike" kern="1200" cap="none" normalizeH="0" baseline="0" dirty="0">
+                        <a:rPr kumimoji="0" lang="pt-BR" altLang="pt-BR" sz="1100" b="0" u="none" strike="noStrike" kern="1200" cap="none" normalizeH="0" baseline="0" dirty="0">
                           <a:ln>
                             <a:noFill/>
                           </a:ln>
+                          <a:solidFill>
+                            <a:schemeClr val="tx1"/>
+                          </a:solidFill>
                           <a:effectLst/>
                           <a:latin typeface="Arial" panose="020B0604020202020204" pitchFamily="34" charset="0"/>
                           <a:cs typeface="Arial" panose="020B0604020202020204" pitchFamily="34" charset="0"/>
@@ -15548,7 +16424,7 @@
                   </a:ext>
                 </a:extLst>
               </a:tr>
-              <a:tr h="1097241">
+              <a:tr h="1019723">
                 <a:tc>
                   <a:txBody>
                     <a:bodyPr/>
@@ -15860,10 +16736,13 @@
                         </a:tabLst>
                       </a:pPr>
                       <a:r>
-                        <a:rPr kumimoji="0" lang="pt-BR" altLang="pt-BR" sz="800" u="none" strike="noStrike" kern="1200" cap="none" normalizeH="0" baseline="0" dirty="0">
+                        <a:rPr kumimoji="0" lang="pt-BR" altLang="pt-BR" sz="1100" b="0" u="none" strike="noStrike" kern="1200" cap="none" normalizeH="0" baseline="0" dirty="0">
                           <a:ln>
                             <a:noFill/>
                           </a:ln>
+                          <a:solidFill>
+                            <a:schemeClr val="tx1"/>
+                          </a:solidFill>
                           <a:effectLst/>
                           <a:latin typeface="Arial" panose="020B0604020202020204" pitchFamily="34" charset="0"/>
                           <a:cs typeface="Arial" panose="020B0604020202020204" pitchFamily="34" charset="0"/>
@@ -15902,10 +16781,13 @@
                         </a:tabLst>
                       </a:pPr>
                       <a:r>
-                        <a:rPr kumimoji="0" lang="pt-BR" altLang="pt-BR" sz="800" u="none" strike="noStrike" kern="1200" cap="none" normalizeH="0" baseline="0" dirty="0">
+                        <a:rPr kumimoji="0" lang="pt-BR" altLang="pt-BR" sz="1100" b="0" u="none" strike="noStrike" kern="1200" cap="none" normalizeH="0" baseline="0" dirty="0">
                           <a:ln>
                             <a:noFill/>
                           </a:ln>
+                          <a:solidFill>
+                            <a:schemeClr val="tx1"/>
+                          </a:solidFill>
                           <a:effectLst/>
                           <a:latin typeface="Arial" panose="020B0604020202020204" pitchFamily="34" charset="0"/>
                           <a:cs typeface="Arial" panose="020B0604020202020204" pitchFamily="34" charset="0"/>
@@ -15944,10 +16826,13 @@
                         </a:tabLst>
                       </a:pPr>
                       <a:r>
-                        <a:rPr kumimoji="0" lang="pt-BR" altLang="pt-BR" sz="800" u="none" strike="noStrike" kern="1200" cap="none" normalizeH="0" baseline="0" dirty="0">
+                        <a:rPr kumimoji="0" lang="pt-BR" altLang="pt-BR" sz="1100" b="0" u="none" strike="noStrike" kern="1200" cap="none" normalizeH="0" baseline="0" dirty="0">
                           <a:ln>
                             <a:noFill/>
                           </a:ln>
+                          <a:solidFill>
+                            <a:schemeClr val="tx1"/>
+                          </a:solidFill>
                           <a:effectLst/>
                           <a:latin typeface="Arial" panose="020B0604020202020204" pitchFamily="34" charset="0"/>
                           <a:cs typeface="Arial" panose="020B0604020202020204" pitchFamily="34" charset="0"/>
@@ -15986,10 +16871,13 @@
                         </a:tabLst>
                       </a:pPr>
                       <a:r>
-                        <a:rPr kumimoji="0" lang="pt-BR" altLang="pt-BR" sz="800" u="none" strike="noStrike" kern="1200" cap="none" normalizeH="0" baseline="0" dirty="0">
+                        <a:rPr kumimoji="0" lang="pt-BR" altLang="pt-BR" sz="1100" b="0" u="none" strike="noStrike" kern="1200" cap="none" normalizeH="0" baseline="0" dirty="0">
                           <a:ln>
                             <a:noFill/>
                           </a:ln>
+                          <a:solidFill>
+                            <a:schemeClr val="tx1"/>
+                          </a:solidFill>
                           <a:effectLst/>
                           <a:latin typeface="Arial" panose="020B0604020202020204" pitchFamily="34" charset="0"/>
                           <a:cs typeface="Arial" panose="020B0604020202020204" pitchFamily="34" charset="0"/>
@@ -16028,10 +16916,13 @@
                         </a:tabLst>
                       </a:pPr>
                       <a:r>
-                        <a:rPr kumimoji="0" lang="pt-BR" altLang="pt-BR" sz="800" u="none" strike="noStrike" kern="1200" cap="none" normalizeH="0" baseline="0" dirty="0">
+                        <a:rPr kumimoji="0" lang="pt-BR" altLang="pt-BR" sz="1100" b="0" u="none" strike="noStrike" kern="1200" cap="none" normalizeH="0" baseline="0" dirty="0">
                           <a:ln>
                             <a:noFill/>
                           </a:ln>
+                          <a:solidFill>
+                            <a:schemeClr val="tx1"/>
+                          </a:solidFill>
                           <a:effectLst/>
                           <a:latin typeface="Arial" panose="020B0604020202020204" pitchFamily="34" charset="0"/>
                           <a:cs typeface="Arial" panose="020B0604020202020204" pitchFamily="34" charset="0"/>
@@ -16070,15 +16961,63 @@
                         </a:tabLst>
                       </a:pPr>
                       <a:r>
-                        <a:rPr kumimoji="0" lang="pt-BR" altLang="pt-BR" sz="800" u="none" strike="noStrike" kern="1200" cap="none" normalizeH="0" baseline="0" dirty="0">
+                        <a:rPr kumimoji="0" lang="pt-BR" altLang="pt-BR" sz="1100" b="0" u="none" strike="noStrike" kern="1200" cap="none" normalizeH="0" baseline="0" dirty="0">
                           <a:ln>
                             <a:noFill/>
                           </a:ln>
+                          <a:solidFill>
+                            <a:schemeClr val="tx1"/>
+                          </a:solidFill>
                           <a:effectLst/>
                           <a:latin typeface="Arial" panose="020B0604020202020204" pitchFamily="34" charset="0"/>
                           <a:cs typeface="Arial" panose="020B0604020202020204" pitchFamily="34" charset="0"/>
                         </a:rPr>
                         <a:t>Filtrar lançamentos por conta financeira</a:t>
+                      </a:r>
+                    </a:p>
+                    <a:p>
+                      <a:pPr marL="171450" marR="0" lvl="0" indent="-171450" algn="l" defTabSz="449263" rtl="0" eaLnBrk="1" fontAlgn="base" latinLnBrk="0" hangingPunct="1">
+                        <a:lnSpc>
+                          <a:spcPct val="94000"/>
+                        </a:lnSpc>
+                        <a:spcBef>
+                          <a:spcPts val="450"/>
+                        </a:spcBef>
+                        <a:spcAft>
+                          <a:spcPct val="0"/>
+                        </a:spcAft>
+                        <a:buClrTx/>
+                        <a:buSzPct val="70000"/>
+                        <a:buFont typeface="Arial" panose="020B0604020202020204" pitchFamily="34" charset="0"/>
+                        <a:buChar char="•"/>
+                        <a:tabLst>
+                          <a:tab pos="0" algn="l"/>
+                          <a:tab pos="914400" algn="l"/>
+                          <a:tab pos="1828800" algn="l"/>
+                          <a:tab pos="2743200" algn="l"/>
+                          <a:tab pos="3657600" algn="l"/>
+                          <a:tab pos="4572000" algn="l"/>
+                          <a:tab pos="5486400" algn="l"/>
+                          <a:tab pos="6400800" algn="l"/>
+                          <a:tab pos="7315200" algn="l"/>
+                          <a:tab pos="8229600" algn="l"/>
+                          <a:tab pos="9144000" algn="l"/>
+                          <a:tab pos="10058400" algn="l"/>
+                        </a:tabLst>
+                      </a:pPr>
+                      <a:r>
+                        <a:rPr kumimoji="0" lang="pt-BR" altLang="pt-BR" sz="1100" b="0" u="none" strike="noStrike" kern="1200" cap="none" normalizeH="0" baseline="0" dirty="0">
+                          <a:ln>
+                            <a:noFill/>
+                          </a:ln>
+                          <a:solidFill>
+                            <a:schemeClr val="tx1"/>
+                          </a:solidFill>
+                          <a:effectLst/>
+                          <a:latin typeface="Arial" panose="020B0604020202020204" pitchFamily="34" charset="0"/>
+                          <a:cs typeface="Arial" panose="020B0604020202020204" pitchFamily="34" charset="0"/>
+                        </a:rPr>
+                        <a:t>Filtrar lançamentos por categorias</a:t>
                       </a:r>
                     </a:p>
                   </a:txBody>
@@ -16090,7 +17029,7 @@
                   </a:ext>
                 </a:extLst>
               </a:tr>
-              <a:tr h="3295583">
+              <a:tr h="1108977">
                 <a:tc>
                   <a:txBody>
                     <a:bodyPr/>
@@ -16402,10 +17341,13 @@
                         </a:tabLst>
                       </a:pPr>
                       <a:r>
-                        <a:rPr kumimoji="0" lang="pt-BR" altLang="pt-BR" sz="800" u="none" strike="noStrike" kern="1200" cap="none" normalizeH="0" baseline="0" dirty="0">
+                        <a:rPr kumimoji="0" lang="pt-BR" altLang="pt-BR" sz="1100" b="0" u="none" strike="noStrike" kern="1200" cap="none" normalizeH="0" baseline="0" dirty="0">
                           <a:ln>
                             <a:noFill/>
                           </a:ln>
+                          <a:solidFill>
+                            <a:schemeClr val="tx1"/>
+                          </a:solidFill>
                           <a:effectLst/>
                           <a:latin typeface="Arial" panose="020B0604020202020204" pitchFamily="34" charset="0"/>
                           <a:cs typeface="Arial" panose="020B0604020202020204" pitchFamily="34" charset="0"/>
@@ -16444,15 +17386,18 @@
                         </a:tabLst>
                       </a:pPr>
                       <a:r>
-                        <a:rPr kumimoji="0" lang="pt-BR" altLang="pt-BR" sz="800" u="none" strike="noStrike" kern="1200" cap="none" normalizeH="0" baseline="0" dirty="0">
+                        <a:rPr kumimoji="0" lang="pt-BR" altLang="pt-BR" sz="1100" b="0" u="none" strike="noStrike" kern="1200" cap="none" normalizeH="0" baseline="0" dirty="0">
                           <a:ln>
                             <a:noFill/>
                           </a:ln>
+                          <a:solidFill>
+                            <a:schemeClr val="tx1"/>
+                          </a:solidFill>
                           <a:effectLst/>
                           <a:latin typeface="Arial" panose="020B0604020202020204" pitchFamily="34" charset="0"/>
                           <a:cs typeface="Arial" panose="020B0604020202020204" pitchFamily="34" charset="0"/>
                         </a:rPr>
-                        <a:t>RN81 – Os possíveis filtros de lançamentos devem ser no mínimo: por período de tempo, por tipo de lançamento, por conta, vencidos, próximos a vencer, e,  já efetivados.</a:t>
+                        <a:t>RN8.1 – Os possíveis filtros de lançamentos devem ser no mínimo: por período de tempo, por tipo de lançamento, por conta, vencidos, próximos a vencer, e,  já efetivados.</a:t>
                       </a:r>
                     </a:p>
                     <a:p>
@@ -16461,7 +17406,7 @@
                           <a:spcPct val="94000"/>
                         </a:lnSpc>
                         <a:spcBef>
-                          <a:spcPts val="450"/>
+                          <a:spcPts val="400"/>
                         </a:spcBef>
                         <a:spcAft>
                           <a:spcPct val="0"/>
@@ -16486,15 +17431,19 @@
                         </a:tabLst>
                       </a:pPr>
                       <a:r>
-                        <a:rPr kumimoji="0" lang="pt-BR" altLang="pt-BR" sz="800" u="none" strike="noStrike" kern="1200" cap="none" normalizeH="0" baseline="0" dirty="0">
+                        <a:rPr kumimoji="0" lang="pt-BR" altLang="pt-BR" sz="1100" b="0" i="0" u="none" strike="noStrike" kern="1200" cap="none" normalizeH="0" baseline="0" dirty="0">
                           <a:ln>
                             <a:noFill/>
                           </a:ln>
+                          <a:solidFill>
+                            <a:schemeClr val="tx1"/>
+                          </a:solidFill>
                           <a:effectLst/>
                           <a:latin typeface="Arial" panose="020B0604020202020204" pitchFamily="34" charset="0"/>
+                          <a:ea typeface="DejaVu Sans" charset="0"/>
                           <a:cs typeface="Arial" panose="020B0604020202020204" pitchFamily="34" charset="0"/>
                         </a:rPr>
-                        <a:t>RN82 - ...</a:t>
+                        <a:t>RN8.2 – Os lançamentos podem ser ordenados na lista por nome ou data.</a:t>
                       </a:r>
                     </a:p>
                     <a:p>
@@ -16503,7 +17452,7 @@
                           <a:spcPct val="94000"/>
                         </a:lnSpc>
                         <a:spcBef>
-                          <a:spcPts val="450"/>
+                          <a:spcPts val="400"/>
                         </a:spcBef>
                         <a:spcAft>
                           <a:spcPct val="0"/>
@@ -16528,15 +17477,62 @@
                         </a:tabLst>
                         <a:defRPr/>
                       </a:pPr>
-                      <a:endParaRPr kumimoji="0" lang="pt-BR" altLang="pt-BR" sz="800" u="none" strike="noStrike" kern="1200" cap="none" normalizeH="0" baseline="0" dirty="0">
+                      <a:r>
+                        <a:rPr kumimoji="0" lang="pt-BR" altLang="pt-BR" sz="1100" b="0" i="0" u="none" strike="noStrike" kern="1200" cap="none" normalizeH="0" baseline="0" dirty="0">
+                          <a:ln>
+                            <a:noFill/>
+                          </a:ln>
+                          <a:solidFill>
+                            <a:schemeClr val="tx1"/>
+                          </a:solidFill>
+                          <a:effectLst/>
+                          <a:latin typeface="Arial" panose="020B0604020202020204" pitchFamily="34" charset="0"/>
+                          <a:ea typeface="DejaVu Sans" charset="0"/>
+                          <a:cs typeface="Arial" panose="020B0604020202020204" pitchFamily="34" charset="0"/>
+                        </a:rPr>
+                        <a:t>RN8.3 – Listar os lançamentos sem nenhum filtro informado.</a:t>
+                      </a:r>
+                    </a:p>
+                    <a:p>
+                      <a:pPr marL="0" marR="0" lvl="0" indent="0" algn="l" defTabSz="449263" rtl="0" eaLnBrk="1" fontAlgn="base" latinLnBrk="0" hangingPunct="1">
+                        <a:lnSpc>
+                          <a:spcPct val="94000"/>
+                        </a:lnSpc>
+                        <a:spcBef>
+                          <a:spcPts val="400"/>
+                        </a:spcBef>
+                        <a:spcAft>
+                          <a:spcPct val="0"/>
+                        </a:spcAft>
+                        <a:buClrTx/>
+                        <a:buSzPct val="70000"/>
+                        <a:buFontTx/>
+                        <a:buNone/>
+                        <a:tabLst>
+                          <a:tab pos="0" algn="l"/>
+                          <a:tab pos="914400" algn="l"/>
+                          <a:tab pos="1828800" algn="l"/>
+                          <a:tab pos="2743200" algn="l"/>
+                          <a:tab pos="3657600" algn="l"/>
+                          <a:tab pos="4572000" algn="l"/>
+                          <a:tab pos="5486400" algn="l"/>
+                          <a:tab pos="6400800" algn="l"/>
+                          <a:tab pos="7315200" algn="l"/>
+                          <a:tab pos="8229600" algn="l"/>
+                          <a:tab pos="9144000" algn="l"/>
+                          <a:tab pos="10058400" algn="l"/>
+                        </a:tabLst>
+                      </a:pPr>
+                      <a:endParaRPr kumimoji="0" lang="pt-BR" altLang="pt-BR" sz="1100" b="0" i="0" u="none" strike="noStrike" kern="1200" cap="none" normalizeH="0" baseline="0" dirty="0">
                         <a:ln>
                           <a:noFill/>
                         </a:ln>
                         <a:solidFill>
-                          <a:srgbClr val="000000"/>
+                          <a:schemeClr val="tx1"/>
                         </a:solidFill>
                         <a:effectLst/>
                         <a:latin typeface="Arial" panose="020B0604020202020204" pitchFamily="34" charset="0"/>
+                        <a:ea typeface="DejaVu Sans" charset="0"/>
                         <a:cs typeface="Arial" panose="020B0604020202020204" pitchFamily="34" charset="0"/>
                       </a:endParaRPr>
                     </a:p>
@@ -16549,7 +17545,7 @@
                   </a:ext>
                 </a:extLst>
               </a:tr>
-              <a:tr h="505571">
+              <a:tr h="959342">
                 <a:tc>
                   <a:txBody>
                     <a:bodyPr/>
@@ -16861,10 +17857,13 @@
                         </a:tabLst>
                       </a:pPr>
                       <a:r>
-                        <a:rPr kumimoji="0" lang="pt-BR" altLang="pt-BR" sz="800" u="none" strike="noStrike" kern="1200" cap="none" normalizeH="0" baseline="0" dirty="0">
+                        <a:rPr kumimoji="0" lang="pt-BR" altLang="pt-BR" sz="1100" b="0" u="none" strike="noStrike" kern="1200" cap="none" normalizeH="0" baseline="0" dirty="0">
                           <a:ln>
                             <a:noFill/>
                           </a:ln>
+                          <a:solidFill>
+                            <a:schemeClr val="tx1"/>
+                          </a:solidFill>
                           <a:effectLst/>
                           <a:latin typeface="Arial" panose="020B0604020202020204" pitchFamily="34" charset="0"/>
                           <a:cs typeface="Arial" panose="020B0604020202020204" pitchFamily="34" charset="0"/>
@@ -16902,17 +17901,261 @@
                           <a:tab pos="10058400" algn="l"/>
                         </a:tabLst>
                       </a:pPr>
-                      <a:endParaRPr kumimoji="0" lang="pt-BR" altLang="pt-BR" sz="800" b="1" i="0" u="none" strike="noStrike" cap="none" normalizeH="0" baseline="0" dirty="0">
+                      <a:r>
+                        <a:rPr kumimoji="0" lang="pt-BR" altLang="pt-BR" sz="1100" b="0" i="0" u="none" strike="noStrike" cap="none" normalizeH="0" baseline="0" dirty="0">
+                          <a:ln>
+                            <a:noFill/>
+                          </a:ln>
+                          <a:solidFill>
+                            <a:schemeClr val="tx1"/>
+                          </a:solidFill>
+                          <a:effectLst/>
+                          <a:latin typeface="Arial" panose="020B0604020202020204" pitchFamily="34" charset="0"/>
+                          <a:cs typeface="Arial" panose="020B0604020202020204" pitchFamily="34" charset="0"/>
+                        </a:rPr>
+                        <a:t>TA8.1 – Tentar listar os lançamentos por período de tempo.</a:t>
+                      </a:r>
+                    </a:p>
+                    <a:p>
+                      <a:pPr marL="0" marR="0" lvl="0" indent="0" algn="l" defTabSz="449263" rtl="0" eaLnBrk="1" fontAlgn="base" latinLnBrk="0" hangingPunct="1">
+                        <a:lnSpc>
+                          <a:spcPct val="94000"/>
+                        </a:lnSpc>
+                        <a:spcBef>
+                          <a:spcPts val="350"/>
+                        </a:spcBef>
+                        <a:spcAft>
+                          <a:spcPct val="0"/>
+                        </a:spcAft>
+                        <a:buClrTx/>
+                        <a:buSzPct val="70000"/>
+                        <a:buFontTx/>
+                        <a:buNone/>
+                        <a:tabLst>
+                          <a:tab pos="0" algn="l"/>
+                          <a:tab pos="914400" algn="l"/>
+                          <a:tab pos="1828800" algn="l"/>
+                          <a:tab pos="2743200" algn="l"/>
+                          <a:tab pos="3657600" algn="l"/>
+                          <a:tab pos="4572000" algn="l"/>
+                          <a:tab pos="5486400" algn="l"/>
+                          <a:tab pos="6400800" algn="l"/>
+                          <a:tab pos="7315200" algn="l"/>
+                          <a:tab pos="8229600" algn="l"/>
+                          <a:tab pos="9144000" algn="l"/>
+                          <a:tab pos="10058400" algn="l"/>
+                        </a:tabLst>
+                        <a:defRPr/>
+                      </a:pPr>
+                      <a:r>
+                        <a:rPr kumimoji="0" lang="pt-BR" altLang="pt-BR" sz="1100" b="0" i="0" u="none" strike="noStrike" cap="none" normalizeH="0" baseline="0" dirty="0">
+                          <a:ln>
+                            <a:noFill/>
+                          </a:ln>
+                          <a:solidFill>
+                            <a:schemeClr val="tx1"/>
+                          </a:solidFill>
+                          <a:effectLst/>
+                          <a:latin typeface="Arial" panose="020B0604020202020204" pitchFamily="34" charset="0"/>
+                          <a:cs typeface="Arial" panose="020B0604020202020204" pitchFamily="34" charset="0"/>
+                        </a:rPr>
+                        <a:t>TA8.2 – Tentar listar os lançamentos por tipo de lançamento.</a:t>
+                      </a:r>
+                    </a:p>
+                    <a:p>
+                      <a:pPr marL="0" marR="0" lvl="0" indent="0" algn="l" defTabSz="449263" rtl="0" eaLnBrk="1" fontAlgn="base" latinLnBrk="0" hangingPunct="1">
+                        <a:lnSpc>
+                          <a:spcPct val="94000"/>
+                        </a:lnSpc>
+                        <a:spcBef>
+                          <a:spcPts val="350"/>
+                        </a:spcBef>
+                        <a:spcAft>
+                          <a:spcPct val="0"/>
+                        </a:spcAft>
+                        <a:buClrTx/>
+                        <a:buSzPct val="70000"/>
+                        <a:buFontTx/>
+                        <a:buNone/>
+                        <a:tabLst>
+                          <a:tab pos="0" algn="l"/>
+                          <a:tab pos="914400" algn="l"/>
+                          <a:tab pos="1828800" algn="l"/>
+                          <a:tab pos="2743200" algn="l"/>
+                          <a:tab pos="3657600" algn="l"/>
+                          <a:tab pos="4572000" algn="l"/>
+                          <a:tab pos="5486400" algn="l"/>
+                          <a:tab pos="6400800" algn="l"/>
+                          <a:tab pos="7315200" algn="l"/>
+                          <a:tab pos="8229600" algn="l"/>
+                          <a:tab pos="9144000" algn="l"/>
+                          <a:tab pos="10058400" algn="l"/>
+                        </a:tabLst>
+                        <a:defRPr/>
+                      </a:pPr>
+                      <a:r>
+                        <a:rPr kumimoji="0" lang="pt-BR" altLang="pt-BR" sz="1100" b="0" i="0" u="none" strike="noStrike" cap="none" normalizeH="0" baseline="0" dirty="0">
+                          <a:ln>
+                            <a:noFill/>
+                          </a:ln>
+                          <a:solidFill>
+                            <a:schemeClr val="tx1"/>
+                          </a:solidFill>
+                          <a:effectLst/>
+                          <a:latin typeface="Arial" panose="020B0604020202020204" pitchFamily="34" charset="0"/>
+                          <a:cs typeface="Arial" panose="020B0604020202020204" pitchFamily="34" charset="0"/>
+                        </a:rPr>
+                        <a:t>TA8.3 – Tentar listar os lançamentos por conta financeira.</a:t>
+                      </a:r>
+                    </a:p>
+                    <a:p>
+                      <a:pPr marL="0" marR="0" lvl="0" indent="0" algn="l" defTabSz="449263" rtl="0" eaLnBrk="1" fontAlgn="base" latinLnBrk="0" hangingPunct="1">
+                        <a:lnSpc>
+                          <a:spcPct val="94000"/>
+                        </a:lnSpc>
+                        <a:spcBef>
+                          <a:spcPts val="350"/>
+                        </a:spcBef>
+                        <a:spcAft>
+                          <a:spcPct val="0"/>
+                        </a:spcAft>
+                        <a:buClrTx/>
+                        <a:buSzPct val="70000"/>
+                        <a:buFontTx/>
+                        <a:buNone/>
+                        <a:tabLst>
+                          <a:tab pos="0" algn="l"/>
+                          <a:tab pos="914400" algn="l"/>
+                          <a:tab pos="1828800" algn="l"/>
+                          <a:tab pos="2743200" algn="l"/>
+                          <a:tab pos="3657600" algn="l"/>
+                          <a:tab pos="4572000" algn="l"/>
+                          <a:tab pos="5486400" algn="l"/>
+                          <a:tab pos="6400800" algn="l"/>
+                          <a:tab pos="7315200" algn="l"/>
+                          <a:tab pos="8229600" algn="l"/>
+                          <a:tab pos="9144000" algn="l"/>
+                          <a:tab pos="10058400" algn="l"/>
+                        </a:tabLst>
+                        <a:defRPr/>
+                      </a:pPr>
+                      <a:r>
+                        <a:rPr kumimoji="0" lang="pt-BR" altLang="pt-BR" sz="1100" b="0" i="0" u="none" strike="noStrike" cap="none" normalizeH="0" baseline="0" dirty="0">
+                          <a:ln>
+                            <a:noFill/>
+                          </a:ln>
+                          <a:solidFill>
+                            <a:schemeClr val="tx1"/>
+                          </a:solidFill>
+                          <a:effectLst/>
+                          <a:latin typeface="Arial" panose="020B0604020202020204" pitchFamily="34" charset="0"/>
+                          <a:cs typeface="Arial" panose="020B0604020202020204" pitchFamily="34" charset="0"/>
+                        </a:rPr>
+                        <a:t>TA8.4 – Tentar listar os lançamentos por vencidos.</a:t>
+                      </a:r>
+                    </a:p>
+                    <a:p>
+                      <a:pPr marL="0" marR="0" lvl="0" indent="0" algn="l" defTabSz="449263" rtl="0" eaLnBrk="1" fontAlgn="base" latinLnBrk="0" hangingPunct="1">
+                        <a:lnSpc>
+                          <a:spcPct val="94000"/>
+                        </a:lnSpc>
+                        <a:spcBef>
+                          <a:spcPts val="350"/>
+                        </a:spcBef>
+                        <a:spcAft>
+                          <a:spcPct val="0"/>
+                        </a:spcAft>
+                        <a:buClrTx/>
+                        <a:buSzPct val="70000"/>
+                        <a:buFontTx/>
+                        <a:buNone/>
+                        <a:tabLst>
+                          <a:tab pos="0" algn="l"/>
+                          <a:tab pos="914400" algn="l"/>
+                          <a:tab pos="1828800" algn="l"/>
+                          <a:tab pos="2743200" algn="l"/>
+                          <a:tab pos="3657600" algn="l"/>
+                          <a:tab pos="4572000" algn="l"/>
+                          <a:tab pos="5486400" algn="l"/>
+                          <a:tab pos="6400800" algn="l"/>
+                          <a:tab pos="7315200" algn="l"/>
+                          <a:tab pos="8229600" algn="l"/>
+                          <a:tab pos="9144000" algn="l"/>
+                          <a:tab pos="10058400" algn="l"/>
+                        </a:tabLst>
+                        <a:defRPr/>
+                      </a:pPr>
+                      <a:r>
+                        <a:rPr kumimoji="0" lang="pt-BR" altLang="pt-BR" sz="1100" b="0" i="0" u="none" strike="noStrike" cap="none" normalizeH="0" baseline="0" dirty="0">
+                          <a:ln>
+                            <a:noFill/>
+                          </a:ln>
+                          <a:solidFill>
+                            <a:schemeClr val="tx1"/>
+                          </a:solidFill>
+                          <a:effectLst/>
+                          <a:latin typeface="Arial" panose="020B0604020202020204" pitchFamily="34" charset="0"/>
+                          <a:cs typeface="Arial" panose="020B0604020202020204" pitchFamily="34" charset="0"/>
+                        </a:rPr>
+                        <a:t>TA8.5 – Tentar listar os lançamentos por próximos a vencer.</a:t>
+                      </a:r>
+                      <a:endParaRPr kumimoji="0" lang="pt-BR" altLang="pt-BR" sz="1100" b="0" u="none" strike="noStrike" kern="1200" cap="none" normalizeH="0" baseline="0" dirty="0">
                         <a:ln>
                           <a:noFill/>
                         </a:ln>
                         <a:solidFill>
-                          <a:srgbClr val="00B050"/>
+                          <a:schemeClr val="tx1"/>
                         </a:solidFill>
                         <a:effectLst/>
                         <a:latin typeface="Arial" panose="020B0604020202020204" pitchFamily="34" charset="0"/>
                         <a:cs typeface="Arial" panose="020B0604020202020204" pitchFamily="34" charset="0"/>
                       </a:endParaRPr>
+                    </a:p>
+                    <a:p>
+                      <a:pPr marL="0" marR="0" lvl="0" indent="0" algn="l" defTabSz="449263" rtl="0" eaLnBrk="1" fontAlgn="base" latinLnBrk="0" hangingPunct="1">
+                        <a:lnSpc>
+                          <a:spcPct val="94000"/>
+                        </a:lnSpc>
+                        <a:spcBef>
+                          <a:spcPts val="350"/>
+                        </a:spcBef>
+                        <a:spcAft>
+                          <a:spcPct val="0"/>
+                        </a:spcAft>
+                        <a:buClrTx/>
+                        <a:buSzPct val="70000"/>
+                        <a:buFontTx/>
+                        <a:buNone/>
+                        <a:tabLst>
+                          <a:tab pos="0" algn="l"/>
+                          <a:tab pos="914400" algn="l"/>
+                          <a:tab pos="1828800" algn="l"/>
+                          <a:tab pos="2743200" algn="l"/>
+                          <a:tab pos="3657600" algn="l"/>
+                          <a:tab pos="4572000" algn="l"/>
+                          <a:tab pos="5486400" algn="l"/>
+                          <a:tab pos="6400800" algn="l"/>
+                          <a:tab pos="7315200" algn="l"/>
+                          <a:tab pos="8229600" algn="l"/>
+                          <a:tab pos="9144000" algn="l"/>
+                          <a:tab pos="10058400" algn="l"/>
+                        </a:tabLst>
+                        <a:defRPr/>
+                      </a:pPr>
+                      <a:r>
+                        <a:rPr kumimoji="0" lang="pt-BR" altLang="pt-BR" sz="1100" b="0" i="0" u="none" strike="noStrike" cap="none" normalizeH="0" baseline="0" dirty="0">
+                          <a:ln>
+                            <a:noFill/>
+                          </a:ln>
+                          <a:solidFill>
+                            <a:schemeClr val="tx1"/>
+                          </a:solidFill>
+                          <a:effectLst/>
+                          <a:latin typeface="Arial" panose="020B0604020202020204" pitchFamily="34" charset="0"/>
+                          <a:cs typeface="Arial" panose="020B0604020202020204" pitchFamily="34" charset="0"/>
+                        </a:rPr>
+                        <a:t>TA8.6 – Tentar listar os lançamentos por categoria.</a:t>
+                      </a:r>
                     </a:p>
                   </a:txBody>
                   <a:tcPr marT="57823" marB="45726" anchor="ctr" horzOverflow="overflow"/>
@@ -16923,7 +18166,7 @@
                   </a:ext>
                 </a:extLst>
               </a:tr>
-              <a:tr h="525957">
+              <a:tr h="314017">
                 <a:tc>
                   <a:txBody>
                     <a:bodyPr/>
@@ -16959,10 +18202,13 @@
                         </a:tabLst>
                       </a:pPr>
                       <a:r>
-                        <a:rPr kumimoji="0" lang="pt-BR" altLang="pt-BR" sz="800" u="none" strike="noStrike" kern="1200" cap="none" normalizeH="0" baseline="0" dirty="0">
+                        <a:rPr kumimoji="0" lang="pt-BR" altLang="pt-BR" sz="1100" b="0" u="none" strike="noStrike" kern="1200" cap="none" normalizeH="0" baseline="0" dirty="0">
                           <a:ln>
                             <a:noFill/>
                           </a:ln>
+                          <a:solidFill>
+                            <a:schemeClr val="tx1"/>
+                          </a:solidFill>
                           <a:effectLst/>
                           <a:latin typeface="Arial" panose="020B0604020202020204" pitchFamily="34" charset="0"/>
                           <a:cs typeface="Arial" panose="020B0604020202020204" pitchFamily="34" charset="0"/>
@@ -17001,7 +18247,10 @@
                         </a:tabLst>
                       </a:pPr>
                       <a:r>
-                        <a:rPr lang="pt-BR" sz="800" dirty="0">
+                        <a:rPr lang="pt-BR" sz="1100" b="0" dirty="0">
+                          <a:solidFill>
+                            <a:schemeClr val="tx1"/>
+                          </a:solidFill>
                           <a:latin typeface="Arial" panose="020B0604020202020204" pitchFamily="34" charset="0"/>
                           <a:cs typeface="Arial" panose="020B0604020202020204" pitchFamily="34" charset="0"/>
                         </a:rPr>
@@ -17017,7 +18266,7 @@
                   </a:ext>
                 </a:extLst>
               </a:tr>
-              <a:tr h="245094">
+              <a:tr h="172877">
                 <a:tc>
                   <a:txBody>
                     <a:bodyPr/>
@@ -17329,27 +18578,19 @@
                         </a:tabLst>
                       </a:pPr>
                       <a:r>
-                        <a:rPr kumimoji="0" lang="pt-BR" altLang="pt-BR" sz="800" u="none" strike="noStrike" kern="1200" cap="none" normalizeH="0" baseline="0" dirty="0">
+                        <a:rPr kumimoji="0" lang="pt-BR" altLang="pt-BR" sz="1100" b="0" u="none" strike="noStrike" kern="1200" cap="none" normalizeH="0" baseline="0" dirty="0">
                           <a:ln>
                             <a:noFill/>
                           </a:ln>
+                          <a:solidFill>
+                            <a:schemeClr val="tx1"/>
+                          </a:solidFill>
                           <a:effectLst/>
                           <a:latin typeface="Arial" panose="020B0604020202020204" pitchFamily="34" charset="0"/>
                           <a:cs typeface="Arial" panose="020B0604020202020204" pitchFamily="34" charset="0"/>
                         </a:rPr>
                         <a:t>Estimativa: ...horas                                           Tempo de Elaboração:  ...horas</a:t>
                       </a:r>
-                      <a:endParaRPr kumimoji="0" lang="pt-BR" altLang="pt-BR" sz="800" u="none" strike="noStrike" kern="1200" cap="none" normalizeH="0" baseline="0" dirty="0">
-                        <a:ln>
-                          <a:noFill/>
-                        </a:ln>
-                        <a:solidFill>
-                          <a:srgbClr val="000000"/>
-                        </a:solidFill>
-                        <a:effectLst/>
-                        <a:latin typeface="Arial" panose="020B0604020202020204" pitchFamily="34" charset="0"/>
-                        <a:cs typeface="Arial" panose="020B0604020202020204" pitchFamily="34" charset="0"/>
-                      </a:endParaRPr>
                     </a:p>
                   </a:txBody>
                   <a:tcPr marT="57823" marB="45726" anchor="ctr" horzOverflow="overflow"/>

</xml_diff>

<commit_message>
Testes de aceitação - falta corrigir menssagens
</commit_message>
<xml_diff>
--- a/GestaoFinancaPessoal/GestaoFinancaPessoal/Documentos/Entrega-02/UserStories.pptx
+++ b/GestaoFinancaPessoal/GestaoFinancaPessoal/Documentos/Entrega-02/UserStories.pptx
@@ -200,7 +200,7 @@
           <a:p>
             <a:fld id="{59A9F43D-7447-447E-A29C-D6932C4AEFE9}" type="datetimeFigureOut">
               <a:rPr lang="pt-BR" smtClean="0"/>
-              <a:t>04/05/2019</a:t>
+              <a:t>05/05/2019</a:t>
             </a:fld>
             <a:endParaRPr lang="pt-BR"/>
           </a:p>
@@ -2334,7 +2334,7 @@
           <a:p>
             <a:fld id="{41691924-F185-4213-BC46-97937F4C6F71}" type="datetimeFigureOut">
               <a:rPr lang="pt-BR" smtClean="0"/>
-              <a:t>04/05/2019</a:t>
+              <a:t>05/05/2019</a:t>
             </a:fld>
             <a:endParaRPr lang="pt-BR"/>
           </a:p>
@@ -2532,7 +2532,7 @@
           <a:p>
             <a:fld id="{41691924-F185-4213-BC46-97937F4C6F71}" type="datetimeFigureOut">
               <a:rPr lang="pt-BR" smtClean="0"/>
-              <a:t>04/05/2019</a:t>
+              <a:t>05/05/2019</a:t>
             </a:fld>
             <a:endParaRPr lang="pt-BR"/>
           </a:p>
@@ -2740,7 +2740,7 @@
           <a:p>
             <a:fld id="{41691924-F185-4213-BC46-97937F4C6F71}" type="datetimeFigureOut">
               <a:rPr lang="pt-BR" smtClean="0"/>
-              <a:t>04/05/2019</a:t>
+              <a:t>05/05/2019</a:t>
             </a:fld>
             <a:endParaRPr lang="pt-BR"/>
           </a:p>
@@ -2938,7 +2938,7 @@
           <a:p>
             <a:fld id="{41691924-F185-4213-BC46-97937F4C6F71}" type="datetimeFigureOut">
               <a:rPr lang="pt-BR" smtClean="0"/>
-              <a:t>04/05/2019</a:t>
+              <a:t>05/05/2019</a:t>
             </a:fld>
             <a:endParaRPr lang="pt-BR"/>
           </a:p>
@@ -3213,7 +3213,7 @@
           <a:p>
             <a:fld id="{41691924-F185-4213-BC46-97937F4C6F71}" type="datetimeFigureOut">
               <a:rPr lang="pt-BR" smtClean="0"/>
-              <a:t>04/05/2019</a:t>
+              <a:t>05/05/2019</a:t>
             </a:fld>
             <a:endParaRPr lang="pt-BR"/>
           </a:p>
@@ -3478,7 +3478,7 @@
           <a:p>
             <a:fld id="{41691924-F185-4213-BC46-97937F4C6F71}" type="datetimeFigureOut">
               <a:rPr lang="pt-BR" smtClean="0"/>
-              <a:t>04/05/2019</a:t>
+              <a:t>05/05/2019</a:t>
             </a:fld>
             <a:endParaRPr lang="pt-BR"/>
           </a:p>
@@ -3890,7 +3890,7 @@
           <a:p>
             <a:fld id="{41691924-F185-4213-BC46-97937F4C6F71}" type="datetimeFigureOut">
               <a:rPr lang="pt-BR" smtClean="0"/>
-              <a:t>04/05/2019</a:t>
+              <a:t>05/05/2019</a:t>
             </a:fld>
             <a:endParaRPr lang="pt-BR"/>
           </a:p>
@@ -4031,7 +4031,7 @@
           <a:p>
             <a:fld id="{41691924-F185-4213-BC46-97937F4C6F71}" type="datetimeFigureOut">
               <a:rPr lang="pt-BR" smtClean="0"/>
-              <a:t>04/05/2019</a:t>
+              <a:t>05/05/2019</a:t>
             </a:fld>
             <a:endParaRPr lang="pt-BR"/>
           </a:p>
@@ -4144,7 +4144,7 @@
           <a:p>
             <a:fld id="{41691924-F185-4213-BC46-97937F4C6F71}" type="datetimeFigureOut">
               <a:rPr lang="pt-BR" smtClean="0"/>
-              <a:t>04/05/2019</a:t>
+              <a:t>05/05/2019</a:t>
             </a:fld>
             <a:endParaRPr lang="pt-BR"/>
           </a:p>
@@ -4455,7 +4455,7 @@
           <a:p>
             <a:fld id="{41691924-F185-4213-BC46-97937F4C6F71}" type="datetimeFigureOut">
               <a:rPr lang="pt-BR" smtClean="0"/>
-              <a:t>04/05/2019</a:t>
+              <a:t>05/05/2019</a:t>
             </a:fld>
             <a:endParaRPr lang="pt-BR"/>
           </a:p>
@@ -4743,7 +4743,7 @@
           <a:p>
             <a:fld id="{41691924-F185-4213-BC46-97937F4C6F71}" type="datetimeFigureOut">
               <a:rPr lang="pt-BR" smtClean="0"/>
-              <a:t>04/05/2019</a:t>
+              <a:t>05/05/2019</a:t>
             </a:fld>
             <a:endParaRPr lang="pt-BR"/>
           </a:p>
@@ -4984,7 +4984,7 @@
           <a:p>
             <a:fld id="{41691924-F185-4213-BC46-97937F4C6F71}" type="datetimeFigureOut">
               <a:rPr lang="pt-BR" smtClean="0"/>
-              <a:t>04/05/2019</a:t>
+              <a:t>05/05/2019</a:t>
             </a:fld>
             <a:endParaRPr lang="pt-BR"/>
           </a:p>
@@ -8931,14 +8931,14 @@
           <p:nvPr>
             <p:extLst>
               <p:ext uri="{D42A27DB-BD31-4B8C-83A1-F6EECF244321}">
-                <p14:modId xmlns:p14="http://schemas.microsoft.com/office/powerpoint/2010/main" val="2905120726"/>
+                <p14:modId xmlns:p14="http://schemas.microsoft.com/office/powerpoint/2010/main" val="435253398"/>
               </p:ext>
             </p:extLst>
           </p:nvPr>
         </p:nvGraphicFramePr>
         <p:xfrm>
           <a:off x="117072" y="114301"/>
-          <a:ext cx="11899220" cy="8244276"/>
+          <a:ext cx="11899220" cy="8153398"/>
         </p:xfrm>
         <a:graphic>
           <a:graphicData uri="http://schemas.openxmlformats.org/drawingml/2006/table">
@@ -11736,48 +11736,6 @@
                           <a:tab pos="9144000" algn="l"/>
                           <a:tab pos="10058400" algn="l"/>
                         </a:tabLst>
-                      </a:pPr>
-                      <a:r>
-                        <a:rPr kumimoji="0" lang="pt-BR" altLang="pt-BR" sz="800" u="none" strike="noStrike" cap="none" normalizeH="0" baseline="0" dirty="0">
-                          <a:ln>
-                            <a:noFill/>
-                          </a:ln>
-                          <a:effectLst/>
-                          <a:latin typeface="Arial" panose="020B0604020202020204" pitchFamily="34" charset="0"/>
-                          <a:cs typeface="Arial" panose="020B0604020202020204" pitchFamily="34" charset="0"/>
-                        </a:rPr>
-                        <a:t>TA5.3 – Tentar criar dois favorecidos ou pagadores com o mesmo nome.</a:t>
-                      </a:r>
-                    </a:p>
-                    <a:p>
-                      <a:pPr marL="0" marR="0" lvl="0" indent="0" algn="l" defTabSz="449263" rtl="0" eaLnBrk="1" fontAlgn="base" latinLnBrk="0" hangingPunct="1">
-                        <a:lnSpc>
-                          <a:spcPct val="94000"/>
-                        </a:lnSpc>
-                        <a:spcBef>
-                          <a:spcPts val="350"/>
-                        </a:spcBef>
-                        <a:spcAft>
-                          <a:spcPct val="0"/>
-                        </a:spcAft>
-                        <a:buClrTx/>
-                        <a:buSzPct val="70000"/>
-                        <a:buFontTx/>
-                        <a:buNone/>
-                        <a:tabLst>
-                          <a:tab pos="0" algn="l"/>
-                          <a:tab pos="914400" algn="l"/>
-                          <a:tab pos="1828800" algn="l"/>
-                          <a:tab pos="2743200" algn="l"/>
-                          <a:tab pos="3657600" algn="l"/>
-                          <a:tab pos="4572000" algn="l"/>
-                          <a:tab pos="5486400" algn="l"/>
-                          <a:tab pos="6400800" algn="l"/>
-                          <a:tab pos="7315200" algn="l"/>
-                          <a:tab pos="8229600" algn="l"/>
-                          <a:tab pos="9144000" algn="l"/>
-                          <a:tab pos="10058400" algn="l"/>
-                        </a:tabLst>
                         <a:defRPr/>
                       </a:pPr>
                       <a:r>
@@ -11789,7 +11747,7 @@
                           <a:latin typeface="Arial" panose="020B0604020202020204" pitchFamily="34" charset="0"/>
                           <a:cs typeface="Arial" panose="020B0604020202020204" pitchFamily="34" charset="0"/>
                         </a:rPr>
-                        <a:t>TA5.4 – Tentar criar dois favorecidos ou pagadores com nomes diferentes.</a:t>
+                        <a:t>TA5.3 – Tentar criar pessoa do tipo jurídica sem indicar o nome da pessoa física como contato.</a:t>
                       </a:r>
                     </a:p>
                     <a:p>
@@ -11832,7 +11790,7 @@
                           <a:latin typeface="Arial" panose="020B0604020202020204" pitchFamily="34" charset="0"/>
                           <a:cs typeface="Arial" panose="020B0604020202020204" pitchFamily="34" charset="0"/>
                         </a:rPr>
-                        <a:t>TA5.5 – Tentar criar pessoa do tipo jurídica sem indicar o nome da pessoa física como contato.</a:t>
+                        <a:t>TA5.4 – Tentar criar pessoa do tipo jurídica indicando nome da pessoa física como contato.</a:t>
                       </a:r>
                     </a:p>
                     <a:p>
@@ -11875,50 +11833,7 @@
                           <a:latin typeface="Arial" panose="020B0604020202020204" pitchFamily="34" charset="0"/>
                           <a:cs typeface="Arial" panose="020B0604020202020204" pitchFamily="34" charset="0"/>
                         </a:rPr>
-                        <a:t>TA5.6 – Tentar criar pessoa do tipo jurídica indicando nome da pessoa física como contato.</a:t>
-                      </a:r>
-                    </a:p>
-                    <a:p>
-                      <a:pPr marL="0" marR="0" lvl="0" indent="0" algn="l" defTabSz="449263" rtl="0" eaLnBrk="1" fontAlgn="base" latinLnBrk="0" hangingPunct="1">
-                        <a:lnSpc>
-                          <a:spcPct val="94000"/>
-                        </a:lnSpc>
-                        <a:spcBef>
-                          <a:spcPts val="350"/>
-                        </a:spcBef>
-                        <a:spcAft>
-                          <a:spcPct val="0"/>
-                        </a:spcAft>
-                        <a:buClrTx/>
-                        <a:buSzPct val="70000"/>
-                        <a:buFontTx/>
-                        <a:buNone/>
-                        <a:tabLst>
-                          <a:tab pos="0" algn="l"/>
-                          <a:tab pos="914400" algn="l"/>
-                          <a:tab pos="1828800" algn="l"/>
-                          <a:tab pos="2743200" algn="l"/>
-                          <a:tab pos="3657600" algn="l"/>
-                          <a:tab pos="4572000" algn="l"/>
-                          <a:tab pos="5486400" algn="l"/>
-                          <a:tab pos="6400800" algn="l"/>
-                          <a:tab pos="7315200" algn="l"/>
-                          <a:tab pos="8229600" algn="l"/>
-                          <a:tab pos="9144000" algn="l"/>
-                          <a:tab pos="10058400" algn="l"/>
-                        </a:tabLst>
-                        <a:defRPr/>
-                      </a:pPr>
-                      <a:r>
-                        <a:rPr kumimoji="0" lang="pt-BR" altLang="pt-BR" sz="800" u="none" strike="noStrike" cap="none" normalizeH="0" baseline="0" dirty="0">
-                          <a:ln>
-                            <a:noFill/>
-                          </a:ln>
-                          <a:effectLst/>
-                          <a:latin typeface="Arial" panose="020B0604020202020204" pitchFamily="34" charset="0"/>
-                          <a:cs typeface="Arial" panose="020B0604020202020204" pitchFamily="34" charset="0"/>
-                        </a:rPr>
-                        <a:t>TA5.7 – Tentar criar dois favorecidos ou pagadores sem </a:t>
+                        <a:t>TA5.5 – Tentar criar favorecidos ou pagadores sem </a:t>
                       </a:r>
                       <a:r>
                         <a:rPr kumimoji="0" lang="pt-BR" altLang="pt-BR" sz="800" u="none" strike="noStrike" kern="1200" cap="none" normalizeH="0" baseline="0" dirty="0">
@@ -11972,7 +11887,61 @@
                           <a:latin typeface="Arial" panose="020B0604020202020204" pitchFamily="34" charset="0"/>
                           <a:cs typeface="Arial" panose="020B0604020202020204" pitchFamily="34" charset="0"/>
                         </a:rPr>
-                        <a:t>TA5.8 – Tentar criar dois favorecidos ou pagadores sem </a:t>
+                        <a:t>TA5.6 – Tentar criar favorecidos ou pagadores com </a:t>
+                      </a:r>
+                      <a:r>
+                        <a:rPr kumimoji="0" lang="pt-BR" altLang="pt-BR" sz="800" u="none" strike="noStrike" kern="1200" cap="none" normalizeH="0" baseline="0" dirty="0">
+                          <a:ln>
+                            <a:noFill/>
+                          </a:ln>
+                          <a:effectLst/>
+                          <a:latin typeface="Arial" panose="020B0604020202020204" pitchFamily="34" charset="0"/>
+                          <a:cs typeface="Arial" panose="020B0604020202020204" pitchFamily="34" charset="0"/>
+                        </a:rPr>
+                        <a:t>CPF/CNPJ.</a:t>
+                      </a:r>
+                    </a:p>
+                    <a:p>
+                      <a:pPr marL="0" marR="0" lvl="0" indent="0" algn="l" defTabSz="449263" rtl="0" eaLnBrk="1" fontAlgn="base" latinLnBrk="0" hangingPunct="1">
+                        <a:lnSpc>
+                          <a:spcPct val="94000"/>
+                        </a:lnSpc>
+                        <a:spcBef>
+                          <a:spcPts val="350"/>
+                        </a:spcBef>
+                        <a:spcAft>
+                          <a:spcPct val="0"/>
+                        </a:spcAft>
+                        <a:buClrTx/>
+                        <a:buSzPct val="70000"/>
+                        <a:buFontTx/>
+                        <a:buNone/>
+                        <a:tabLst>
+                          <a:tab pos="0" algn="l"/>
+                          <a:tab pos="914400" algn="l"/>
+                          <a:tab pos="1828800" algn="l"/>
+                          <a:tab pos="2743200" algn="l"/>
+                          <a:tab pos="3657600" algn="l"/>
+                          <a:tab pos="4572000" algn="l"/>
+                          <a:tab pos="5486400" algn="l"/>
+                          <a:tab pos="6400800" algn="l"/>
+                          <a:tab pos="7315200" algn="l"/>
+                          <a:tab pos="8229600" algn="l"/>
+                          <a:tab pos="9144000" algn="l"/>
+                          <a:tab pos="10058400" algn="l"/>
+                        </a:tabLst>
+                        <a:defRPr/>
+                      </a:pPr>
+                      <a:r>
+                        <a:rPr kumimoji="0" lang="pt-BR" altLang="pt-BR" sz="800" u="none" strike="noStrike" cap="none" normalizeH="0" baseline="0" dirty="0">
+                          <a:ln>
+                            <a:noFill/>
+                          </a:ln>
+                          <a:effectLst/>
+                          <a:latin typeface="Arial" panose="020B0604020202020204" pitchFamily="34" charset="0"/>
+                          <a:cs typeface="Arial" panose="020B0604020202020204" pitchFamily="34" charset="0"/>
+                        </a:rPr>
+                        <a:t>TA5.7 – Tentar criar favorecidos ou pagadores sem </a:t>
                       </a:r>
                       <a:r>
                         <a:rPr kumimoji="0" lang="pt-BR" altLang="pt-BR" sz="800" u="none" strike="noStrike" kern="1200" cap="none" normalizeH="0" baseline="0" dirty="0">
@@ -12034,7 +12003,7 @@
                           <a:latin typeface="Arial" panose="020B0604020202020204" pitchFamily="34" charset="0"/>
                           <a:cs typeface="Arial" panose="020B0604020202020204" pitchFamily="34" charset="0"/>
                         </a:rPr>
-                        <a:t>TA5.9 – Tentar criar dois favorecidos ou pagadores sem </a:t>
+                        <a:t>TA5.8 – Tentar criar favorecidos ou pagadores sem </a:t>
                       </a:r>
                       <a:r>
                         <a:rPr lang="pt-BR" sz="800" kern="1200" dirty="0">
@@ -12096,7 +12065,7 @@
                           <a:latin typeface="Arial" panose="020B0604020202020204" pitchFamily="34" charset="0"/>
                           <a:cs typeface="Arial" panose="020B0604020202020204" pitchFamily="34" charset="0"/>
                         </a:rPr>
-                        <a:t>TA5.10 – Tentar criar dois favorecidos ou pagadores sem </a:t>
+                        <a:t>TA5.9 – Tentar criar favorecidos ou pagadores sem </a:t>
                       </a:r>
                       <a:r>
                         <a:rPr lang="pt-BR" sz="800" kern="1200" dirty="0">
@@ -12158,7 +12127,7 @@
                           <a:latin typeface="Arial" panose="020B0604020202020204" pitchFamily="34" charset="0"/>
                           <a:cs typeface="Arial" panose="020B0604020202020204" pitchFamily="34" charset="0"/>
                         </a:rPr>
-                        <a:t>TA5.11 – Tentar criar dois favorecidos ou pagadores sem </a:t>
+                        <a:t>TA5.10 – Tentar criar favorecidos ou pagadores sem </a:t>
                       </a:r>
                       <a:r>
                         <a:rPr lang="pt-BR" sz="800" kern="1200" dirty="0">
@@ -12220,7 +12189,7 @@
                           <a:latin typeface="Arial" panose="020B0604020202020204" pitchFamily="34" charset="0"/>
                           <a:cs typeface="Arial" panose="020B0604020202020204" pitchFamily="34" charset="0"/>
                         </a:rPr>
-                        <a:t>TA5.12 – Tentar criar dois favorecidos ou pagadores sem </a:t>
+                        <a:t>TA5.11 – Tentar criar favorecidos ou pagadores sem </a:t>
                       </a:r>
                       <a:r>
                         <a:rPr lang="pt-BR" sz="800" kern="1200" dirty="0">
@@ -12282,7 +12251,7 @@
                           <a:latin typeface="Arial" panose="020B0604020202020204" pitchFamily="34" charset="0"/>
                           <a:cs typeface="Arial" panose="020B0604020202020204" pitchFamily="34" charset="0"/>
                         </a:rPr>
-                        <a:t>TA5.13 – Tentar criar dois favorecidos ou pagadores sem </a:t>
+                        <a:t>TA5.12 – Tentar criar favorecidos ou pagadores sem </a:t>
                       </a:r>
                       <a:r>
                         <a:rPr lang="pt-BR" sz="800" kern="1200" dirty="0">
@@ -12344,7 +12313,7 @@
                           <a:latin typeface="Arial" panose="020B0604020202020204" pitchFamily="34" charset="0"/>
                           <a:cs typeface="Arial" panose="020B0604020202020204" pitchFamily="34" charset="0"/>
                         </a:rPr>
-                        <a:t>TA5.14 – Tentar criar dois favorecidos ou pagadores sem </a:t>
+                        <a:t>TA5.13 – Tentar criar favorecidos ou pagadores sem </a:t>
                       </a:r>
                       <a:r>
                         <a:rPr lang="pt-BR" sz="800" kern="1200" dirty="0">
@@ -12406,7 +12375,7 @@
                           <a:latin typeface="Arial" panose="020B0604020202020204" pitchFamily="34" charset="0"/>
                           <a:cs typeface="Arial" panose="020B0604020202020204" pitchFamily="34" charset="0"/>
                         </a:rPr>
-                        <a:t>TA5.15 – Tentar criar dois favorecidos ou pagadores sem </a:t>
+                        <a:t>TA5.14 – Tentar criar favorecidos ou pagadores sem </a:t>
                       </a:r>
                       <a:r>
                         <a:rPr lang="pt-BR" sz="800" kern="1200" dirty="0">
@@ -12468,7 +12437,7 @@
                           <a:latin typeface="Arial" panose="020B0604020202020204" pitchFamily="34" charset="0"/>
                           <a:cs typeface="Arial" panose="020B0604020202020204" pitchFamily="34" charset="0"/>
                         </a:rPr>
-                        <a:t>TA5.16 – Tentar criar dois favorecidos ou pagadores sem </a:t>
+                        <a:t>TA5.15 – Tentar criar favorecidos ou pagadores sem </a:t>
                       </a:r>
                       <a:r>
                         <a:rPr lang="pt-BR" sz="800" kern="1200" dirty="0">

</xml_diff>